<commit_message>
fixed some documentation, added my presentation slides
</commit_message>
<xml_diff>
--- a/Presentation Slides/pedro-montero-finalpresentation.pptx
+++ b/Presentation Slides/pedro-montero-finalpresentation.pptx
@@ -5,10 +5,10 @@
     <p:sldMasterId id="2147483914" r:id="rId1"/>
   </p:sldMasterIdLst>
   <p:notesMasterIdLst>
-    <p:notesMasterId r:id="rId23"/>
+    <p:notesMasterId r:id="rId24"/>
   </p:notesMasterIdLst>
   <p:handoutMasterIdLst>
-    <p:handoutMasterId r:id="rId24"/>
+    <p:handoutMasterId r:id="rId25"/>
   </p:handoutMasterIdLst>
   <p:sldIdLst>
     <p:sldId id="256" r:id="rId2"/>
@@ -18,20 +18,21 @@
     <p:sldId id="357" r:id="rId6"/>
     <p:sldId id="346" r:id="rId7"/>
     <p:sldId id="358" r:id="rId8"/>
-    <p:sldId id="347" r:id="rId9"/>
-    <p:sldId id="365" r:id="rId10"/>
-    <p:sldId id="349" r:id="rId11"/>
-    <p:sldId id="350" r:id="rId12"/>
-    <p:sldId id="351" r:id="rId13"/>
-    <p:sldId id="352" r:id="rId14"/>
-    <p:sldId id="359" r:id="rId15"/>
-    <p:sldId id="353" r:id="rId16"/>
-    <p:sldId id="364" r:id="rId17"/>
-    <p:sldId id="354" r:id="rId18"/>
-    <p:sldId id="363" r:id="rId19"/>
-    <p:sldId id="355" r:id="rId20"/>
-    <p:sldId id="360" r:id="rId21"/>
-    <p:sldId id="361" r:id="rId22"/>
+    <p:sldId id="365" r:id="rId9"/>
+    <p:sldId id="349" r:id="rId10"/>
+    <p:sldId id="350" r:id="rId11"/>
+    <p:sldId id="351" r:id="rId12"/>
+    <p:sldId id="352" r:id="rId13"/>
+    <p:sldId id="359" r:id="rId14"/>
+    <p:sldId id="353" r:id="rId15"/>
+    <p:sldId id="364" r:id="rId16"/>
+    <p:sldId id="354" r:id="rId17"/>
+    <p:sldId id="363" r:id="rId18"/>
+    <p:sldId id="366" r:id="rId19"/>
+    <p:sldId id="367" r:id="rId20"/>
+    <p:sldId id="355" r:id="rId21"/>
+    <p:sldId id="360" r:id="rId22"/>
+    <p:sldId id="361" r:id="rId23"/>
   </p:sldIdLst>
   <p:sldSz cx="9144000" cy="6858000" type="screen4x3"/>
   <p:notesSz cx="6858000" cy="9144000"/>
@@ -293,7 +294,7 @@
               <a:pPr>
                 <a:defRPr/>
               </a:pPr>
-              <a:t>12/7/2015</a:t>
+              <a:t>12/9/2015</a:t>
             </a:fld>
             <a:endParaRPr lang="en-US"/>
           </a:p>
@@ -498,7 +499,7 @@
               <a:pPr>
                 <a:defRPr/>
               </a:pPr>
-              <a:t>12/7/2015</a:t>
+              <a:t>12/9/2015</a:t>
             </a:fld>
             <a:endParaRPr lang="en-US"/>
           </a:p>
@@ -1085,31 +1086,25 @@
           <a:p>
             <a:r>
               <a:rPr lang="en-US" dirty="0" smtClean="0"/>
-              <a:t>5. System design:</a:t>
+              <a:t>6. Detailed design:</a:t>
             </a:r>
           </a:p>
           <a:p>
             <a:r>
               <a:rPr lang="en-US" dirty="0" smtClean="0"/>
-              <a:t>5.1. System decomposition; identify the architecture patterns used (one slide).</a:t>
+              <a:t>6.1. Minimal class diagram. Identify the design patterns used (one or more slides).</a:t>
             </a:r>
           </a:p>
           <a:p>
             <a:r>
               <a:rPr lang="en-US" dirty="0" smtClean="0"/>
-              <a:t>5.2. System deployment – h/w and s/w requirements (one slide).</a:t>
+              <a:t>6.2. State machine for the main control object or the most important object of the implemented uses cases (one or more slides).</a:t>
             </a:r>
           </a:p>
           <a:p>
             <a:r>
               <a:rPr lang="en-US" dirty="0" smtClean="0"/>
-              <a:t>5.3. Persistent data design (one slide).</a:t>
-            </a:r>
-          </a:p>
-          <a:p>
-            <a:r>
-              <a:rPr lang="en-US" dirty="0" smtClean="0"/>
-              <a:t>5.4. Security/Privacy (one slide).</a:t>
+              <a:t>6.3. Main algorithm used related to an implemented use case described above (one or more slides).</a:t>
             </a:r>
           </a:p>
           <a:p>
@@ -1144,7 +1139,7 @@
     </p:spTree>
     <p:extLst>
       <p:ext uri="{BB962C8B-B14F-4D97-AF65-F5344CB8AC3E}">
-        <p14:creationId xmlns:p14="http://schemas.microsoft.com/office/powerpoint/2010/main" val="2880857459"/>
+        <p14:creationId xmlns:p14="http://schemas.microsoft.com/office/powerpoint/2010/main" val="458351287"/>
       </p:ext>
     </p:extLst>
   </p:cSld>
@@ -1253,7 +1248,7 @@
     </p:spTree>
     <p:extLst>
       <p:ext uri="{BB962C8B-B14F-4D97-AF65-F5344CB8AC3E}">
-        <p14:creationId xmlns:p14="http://schemas.microsoft.com/office/powerpoint/2010/main" val="458351287"/>
+        <p14:creationId xmlns:p14="http://schemas.microsoft.com/office/powerpoint/2010/main" val="741211697"/>
       </p:ext>
     </p:extLst>
   </p:cSld>
@@ -1331,6 +1326,9 @@
             </a:r>
           </a:p>
           <a:p>
+            <a:endParaRPr lang="en-US" dirty="0" smtClean="0"/>
+          </a:p>
+          <a:p>
             <a:endParaRPr lang="en-US" dirty="0"/>
           </a:p>
         </p:txBody>
@@ -1362,7 +1360,7 @@
     </p:spTree>
     <p:extLst>
       <p:ext uri="{BB962C8B-B14F-4D97-AF65-F5344CB8AC3E}">
-        <p14:creationId xmlns:p14="http://schemas.microsoft.com/office/powerpoint/2010/main" val="741211697"/>
+        <p14:creationId xmlns:p14="http://schemas.microsoft.com/office/powerpoint/2010/main" val="2426442925"/>
       </p:ext>
     </p:extLst>
   </p:cSld>
@@ -1474,7 +1472,7 @@
     </p:spTree>
     <p:extLst>
       <p:ext uri="{BB962C8B-B14F-4D97-AF65-F5344CB8AC3E}">
-        <p14:creationId xmlns:p14="http://schemas.microsoft.com/office/powerpoint/2010/main" val="2426442925"/>
+        <p14:creationId xmlns:p14="http://schemas.microsoft.com/office/powerpoint/2010/main" val="3070512801"/>
       </p:ext>
     </p:extLst>
   </p:cSld>
@@ -1530,29 +1528,20 @@
           <a:p>
             <a:r>
               <a:rPr lang="en-US" dirty="0" smtClean="0"/>
-              <a:t>6. Detailed design:</a:t>
+              <a:t>7. Test Suites and Test Cases (one sunny day and one rainy day) for the use case represented in part (5) above (2 slides).</a:t>
             </a:r>
           </a:p>
           <a:p>
             <a:r>
               <a:rPr lang="en-US" dirty="0" smtClean="0"/>
-              <a:t>6.1. Minimal class diagram. Identify the design patterns used (one or more slides).</a:t>
+              <a:t>7.1 One sunny day and one rainy day for the implemented use cases (one or more slides).</a:t>
             </a:r>
           </a:p>
           <a:p>
             <a:r>
               <a:rPr lang="en-US" dirty="0" smtClean="0"/>
-              <a:t>6.2. State machine for the main control object or the most important object of the implemented uses cases (one or more slides).</a:t>
-            </a:r>
-          </a:p>
-          <a:p>
-            <a:r>
-              <a:rPr lang="en-US" dirty="0" smtClean="0"/>
-              <a:t>6.3. Main algorithm used related to an implemented use case described above (one or more slides).</a:t>
-            </a:r>
-          </a:p>
-          <a:p>
-            <a:endParaRPr lang="en-US" dirty="0" smtClean="0"/>
+              <a:t>7.2 Automated test scripts for the implemented use cases (one or more slides).</a:t>
+            </a:r>
           </a:p>
           <a:p>
             <a:endParaRPr lang="en-US" dirty="0"/>
@@ -1586,7 +1575,7 @@
     </p:spTree>
     <p:extLst>
       <p:ext uri="{BB962C8B-B14F-4D97-AF65-F5344CB8AC3E}">
-        <p14:creationId xmlns:p14="http://schemas.microsoft.com/office/powerpoint/2010/main" val="3070512801"/>
+        <p14:creationId xmlns:p14="http://schemas.microsoft.com/office/powerpoint/2010/main" val="345689425"/>
       </p:ext>
     </p:extLst>
   </p:cSld>
@@ -1689,7 +1678,7 @@
     </p:spTree>
     <p:extLst>
       <p:ext uri="{BB962C8B-B14F-4D97-AF65-F5344CB8AC3E}">
-        <p14:creationId xmlns:p14="http://schemas.microsoft.com/office/powerpoint/2010/main" val="345689425"/>
+        <p14:creationId xmlns:p14="http://schemas.microsoft.com/office/powerpoint/2010/main" val="2591097526"/>
       </p:ext>
     </p:extLst>
   </p:cSld>
@@ -1792,7 +1781,7 @@
     </p:spTree>
     <p:extLst>
       <p:ext uri="{BB962C8B-B14F-4D97-AF65-F5344CB8AC3E}">
-        <p14:creationId xmlns:p14="http://schemas.microsoft.com/office/powerpoint/2010/main" val="2591097526"/>
+        <p14:creationId xmlns:p14="http://schemas.microsoft.com/office/powerpoint/2010/main" val="4062870495"/>
       </p:ext>
     </p:extLst>
   </p:cSld>
@@ -1848,29 +1837,23 @@
           <a:p>
             <a:r>
               <a:rPr lang="en-US" dirty="0" smtClean="0"/>
-              <a:t>Summarize your contribution</a:t>
+              <a:t>7. Test Suites and Test Cases (one sunny day and one rainy day) for the use case represented in part (5) above (2 slides).</a:t>
             </a:r>
           </a:p>
           <a:p>
             <a:r>
               <a:rPr lang="en-US" dirty="0" smtClean="0"/>
-              <a:t>Include your contact information</a:t>
+              <a:t>7.1 One sunny day and one rainy day for the implemented use cases (one or more slides).</a:t>
             </a:r>
           </a:p>
           <a:p>
             <a:r>
               <a:rPr lang="en-US" dirty="0" smtClean="0"/>
-              <a:t>Ask if anyone has any questions for you.</a:t>
-            </a:r>
-          </a:p>
-          <a:p>
-            <a:r>
-              <a:rPr lang="en-US" smtClean="0"/>
-              <a:t>Thank your audience</a:t>
-            </a:r>
-          </a:p>
-          <a:p>
-            <a:endParaRPr lang="en-US"/>
+              <a:t>7.2 Automated test scripts for the implemented use cases (one or more slides).</a:t>
+            </a:r>
+          </a:p>
+          <a:p>
+            <a:endParaRPr lang="en-US" dirty="0"/>
           </a:p>
         </p:txBody>
       </p:sp>
@@ -1901,7 +1884,7 @@
     </p:spTree>
     <p:extLst>
       <p:ext uri="{BB962C8B-B14F-4D97-AF65-F5344CB8AC3E}">
-        <p14:creationId xmlns:p14="http://schemas.microsoft.com/office/powerpoint/2010/main" val="2195670456"/>
+        <p14:creationId xmlns:p14="http://schemas.microsoft.com/office/powerpoint/2010/main" val="3318236993"/>
       </p:ext>
     </p:extLst>
   </p:cSld>
@@ -2010,7 +1993,7 @@
     </p:spTree>
     <p:extLst>
       <p:ext uri="{BB962C8B-B14F-4D97-AF65-F5344CB8AC3E}">
-        <p14:creationId xmlns:p14="http://schemas.microsoft.com/office/powerpoint/2010/main" val="3413203387"/>
+        <p14:creationId xmlns:p14="http://schemas.microsoft.com/office/powerpoint/2010/main" val="2195670456"/>
       </p:ext>
     </p:extLst>
   </p:cSld>
@@ -2226,6 +2209,115 @@
     </p:spTree>
     <p:extLst>
       <p:ext uri="{BB962C8B-B14F-4D97-AF65-F5344CB8AC3E}">
+        <p14:creationId xmlns:p14="http://schemas.microsoft.com/office/powerpoint/2010/main" val="3413203387"/>
+      </p:ext>
+    </p:extLst>
+  </p:cSld>
+  <p:clrMapOvr>
+    <a:masterClrMapping/>
+  </p:clrMapOvr>
+</p:notes>
+</file>
+
+<file path=ppt/notesSlides/notesSlide21.xml><?xml version="1.0" encoding="utf-8"?>
+<p:notes xmlns:a="http://schemas.openxmlformats.org/drawingml/2006/main" xmlns:r="http://schemas.openxmlformats.org/officeDocument/2006/relationships" xmlns:p="http://schemas.openxmlformats.org/presentationml/2006/main">
+  <p:cSld>
+    <p:spTree>
+      <p:nvGrpSpPr>
+        <p:cNvPr id="1" name=""/>
+        <p:cNvGrpSpPr/>
+        <p:nvPr/>
+      </p:nvGrpSpPr>
+      <p:grpSpPr>
+        <a:xfrm>
+          <a:off x="0" y="0"/>
+          <a:ext cx="0" cy="0"/>
+          <a:chOff x="0" y="0"/>
+          <a:chExt cx="0" cy="0"/>
+        </a:xfrm>
+      </p:grpSpPr>
+      <p:sp>
+        <p:nvSpPr>
+          <p:cNvPr id="2" name="Slide Image Placeholder 1"/>
+          <p:cNvSpPr>
+            <a:spLocks noGrp="1" noRot="1" noChangeAspect="1"/>
+          </p:cNvSpPr>
+          <p:nvPr>
+            <p:ph type="sldImg"/>
+          </p:nvPr>
+        </p:nvSpPr>
+        <p:spPr/>
+      </p:sp>
+      <p:sp>
+        <p:nvSpPr>
+          <p:cNvPr id="3" name="Notes Placeholder 2"/>
+          <p:cNvSpPr>
+            <a:spLocks noGrp="1"/>
+          </p:cNvSpPr>
+          <p:nvPr>
+            <p:ph type="body" idx="1"/>
+          </p:nvPr>
+        </p:nvSpPr>
+        <p:spPr/>
+        <p:txBody>
+          <a:bodyPr/>
+          <a:lstStyle/>
+          <a:p>
+            <a:r>
+              <a:rPr lang="en-US" dirty="0" smtClean="0"/>
+              <a:t>Summarize your contribution</a:t>
+            </a:r>
+          </a:p>
+          <a:p>
+            <a:r>
+              <a:rPr lang="en-US" dirty="0" smtClean="0"/>
+              <a:t>Include your contact information</a:t>
+            </a:r>
+          </a:p>
+          <a:p>
+            <a:r>
+              <a:rPr lang="en-US" dirty="0" smtClean="0"/>
+              <a:t>Ask if anyone has any questions for you.</a:t>
+            </a:r>
+          </a:p>
+          <a:p>
+            <a:r>
+              <a:rPr lang="en-US" smtClean="0"/>
+              <a:t>Thank your audience</a:t>
+            </a:r>
+          </a:p>
+          <a:p>
+            <a:endParaRPr lang="en-US"/>
+          </a:p>
+        </p:txBody>
+      </p:sp>
+      <p:sp>
+        <p:nvSpPr>
+          <p:cNvPr id="4" name="Slide Number Placeholder 3"/>
+          <p:cNvSpPr>
+            <a:spLocks noGrp="1"/>
+          </p:cNvSpPr>
+          <p:nvPr>
+            <p:ph type="sldNum" sz="quarter" idx="10"/>
+          </p:nvPr>
+        </p:nvSpPr>
+        <p:spPr/>
+        <p:txBody>
+          <a:bodyPr/>
+          <a:lstStyle/>
+          <a:p>
+            <a:fld id="{A6446FAC-226B-4115-960C-7B2E97248D67}" type="slidenum">
+              <a:rPr lang="en-US" altLang="en-US" smtClean="0"/>
+              <a:pPr/>
+              <a:t>22</a:t>
+            </a:fld>
+            <a:endParaRPr lang="en-US" altLang="en-US"/>
+          </a:p>
+        </p:txBody>
+      </p:sp>
+    </p:spTree>
+    <p:extLst>
+      <p:ext uri="{BB962C8B-B14F-4D97-AF65-F5344CB8AC3E}">
         <p14:creationId xmlns:p14="http://schemas.microsoft.com/office/powerpoint/2010/main" val="2790720382"/>
       </p:ext>
     </p:extLst>
@@ -2771,7 +2863,7 @@
     </p:spTree>
     <p:extLst>
       <p:ext uri="{BB962C8B-B14F-4D97-AF65-F5344CB8AC3E}">
-        <p14:creationId xmlns:p14="http://schemas.microsoft.com/office/powerpoint/2010/main" val="955595854"/>
+        <p14:creationId xmlns:p14="http://schemas.microsoft.com/office/powerpoint/2010/main" val="3330053532"/>
       </p:ext>
     </p:extLst>
   </p:cSld>
@@ -2827,25 +2919,31 @@
           <a:p>
             <a:r>
               <a:rPr lang="en-US" dirty="0" smtClean="0"/>
-              <a:t>4. Requirements:</a:t>
+              <a:t>5. System design:</a:t>
             </a:r>
           </a:p>
           <a:p>
             <a:r>
               <a:rPr lang="en-US" dirty="0" smtClean="0"/>
-              <a:t>4.1. User stories implemented (one or more slides).</a:t>
+              <a:t>5.1. System decomposition; identify the architecture patterns used (one slide).</a:t>
             </a:r>
           </a:p>
           <a:p>
             <a:r>
               <a:rPr lang="en-US" dirty="0" smtClean="0"/>
-              <a:t>4.2. UML use cases and the use case diagram for the implemented use cases (one or more slides).</a:t>
+              <a:t>5.2. System deployment – h/w and s/w requirements (one slide).</a:t>
             </a:r>
           </a:p>
           <a:p>
             <a:r>
               <a:rPr lang="en-US" dirty="0" smtClean="0"/>
-              <a:t>4.3. UML sequence diagrams for the implemented use cases.</a:t>
+              <a:t>5.3. Persistent data design (one slide).</a:t>
+            </a:r>
+          </a:p>
+          <a:p>
+            <a:r>
+              <a:rPr lang="en-US" dirty="0" smtClean="0"/>
+              <a:t>5.4. Security/Privacy (one slide).</a:t>
             </a:r>
           </a:p>
           <a:p>
@@ -2880,7 +2978,7 @@
     </p:spTree>
     <p:extLst>
       <p:ext uri="{BB962C8B-B14F-4D97-AF65-F5344CB8AC3E}">
-        <p14:creationId xmlns:p14="http://schemas.microsoft.com/office/powerpoint/2010/main" val="3330053532"/>
+        <p14:creationId xmlns:p14="http://schemas.microsoft.com/office/powerpoint/2010/main" val="2880857459"/>
       </p:ext>
     </p:extLst>
   </p:cSld>
@@ -3057,14 +3155,14 @@
           </a:ln>
           <a:extLst>
             <a:ext uri="{909E8E84-426E-40dd-AFC4-6F175D3DCCD1}">
-              <a14:hiddenFill xmlns:a14="http://schemas.microsoft.com/office/drawing/2010/main" xmlns="">
+              <a14:hiddenFill xmlns="" xmlns:a14="http://schemas.microsoft.com/office/drawing/2010/main">
                 <a:solidFill>
                   <a:srgbClr val="FFFFFF"/>
                 </a:solidFill>
               </a14:hiddenFill>
             </a:ext>
             <a:ext uri="{91240B29-F687-4f45-9708-019B960494DF}">
-              <a14:hiddenLine xmlns:a14="http://schemas.microsoft.com/office/drawing/2010/main" xmlns="" w="9525">
+              <a14:hiddenLine xmlns="" xmlns:a14="http://schemas.microsoft.com/office/drawing/2010/main" w="9525">
                 <a:solidFill>
                   <a:srgbClr val="000000"/>
                 </a:solidFill>
@@ -3285,7 +3383,7 @@
               <a:pPr>
                 <a:defRPr/>
               </a:pPr>
-              <a:t>12/7/2015</a:t>
+              <a:t>12/9/2015</a:t>
             </a:fld>
             <a:endParaRPr lang="en-US"/>
           </a:p>
@@ -3382,14 +3480,14 @@
           </a:ln>
           <a:extLst>
             <a:ext uri="{909E8E84-426E-40dd-AFC4-6F175D3DCCD1}">
-              <a14:hiddenFill xmlns:a14="http://schemas.microsoft.com/office/drawing/2010/main" xmlns="">
+              <a14:hiddenFill xmlns="" xmlns:a14="http://schemas.microsoft.com/office/drawing/2010/main">
                 <a:solidFill>
                   <a:srgbClr val="FFFFFF"/>
                 </a:solidFill>
               </a14:hiddenFill>
             </a:ext>
             <a:ext uri="{91240B29-F687-4f45-9708-019B960494DF}">
-              <a14:hiddenLine xmlns:a14="http://schemas.microsoft.com/office/drawing/2010/main" xmlns="" w="9525">
+              <a14:hiddenLine xmlns="" xmlns:a14="http://schemas.microsoft.com/office/drawing/2010/main" w="9525">
                 <a:solidFill>
                   <a:srgbClr val="000000"/>
                 </a:solidFill>
@@ -3428,7 +3526,7 @@
               <a:pPr>
                 <a:defRPr/>
               </a:pPr>
-              <a:t>12/7/2015</a:t>
+              <a:t>12/9/2015</a:t>
             </a:fld>
             <a:endParaRPr lang="en-US"/>
           </a:p>
@@ -3553,14 +3651,14 @@
           </a:ln>
           <a:extLst>
             <a:ext uri="{909E8E84-426E-40dd-AFC4-6F175D3DCCD1}">
-              <a14:hiddenFill xmlns:a14="http://schemas.microsoft.com/office/drawing/2010/main" xmlns="">
+              <a14:hiddenFill xmlns="" xmlns:a14="http://schemas.microsoft.com/office/drawing/2010/main">
                 <a:solidFill>
                   <a:srgbClr val="FFFFFF"/>
                 </a:solidFill>
               </a14:hiddenFill>
             </a:ext>
             <a:ext uri="{91240B29-F687-4f45-9708-019B960494DF}">
-              <a14:hiddenLine xmlns:a14="http://schemas.microsoft.com/office/drawing/2010/main" xmlns="" w="9525">
+              <a14:hiddenLine xmlns="" xmlns:a14="http://schemas.microsoft.com/office/drawing/2010/main" w="9525">
                 <a:solidFill>
                   <a:srgbClr val="000000"/>
                 </a:solidFill>
@@ -3785,7 +3883,7 @@
               <a:pPr>
                 <a:defRPr/>
               </a:pPr>
-              <a:t>12/7/2015</a:t>
+              <a:t>12/9/2015</a:t>
             </a:fld>
             <a:endParaRPr lang="en-US"/>
           </a:p>
@@ -3910,14 +4008,14 @@
           </a:ln>
           <a:extLst>
             <a:ext uri="{909E8E84-426E-40dd-AFC4-6F175D3DCCD1}">
-              <a14:hiddenFill xmlns:a14="http://schemas.microsoft.com/office/drawing/2010/main" xmlns="">
+              <a14:hiddenFill xmlns="" xmlns:a14="http://schemas.microsoft.com/office/drawing/2010/main">
                 <a:solidFill>
                   <a:srgbClr val="FFFFFF"/>
                 </a:solidFill>
               </a14:hiddenFill>
             </a:ext>
             <a:ext uri="{91240B29-F687-4f45-9708-019B960494DF}">
-              <a14:hiddenLine xmlns:a14="http://schemas.microsoft.com/office/drawing/2010/main" xmlns="" w="9525">
+              <a14:hiddenLine xmlns="" xmlns:a14="http://schemas.microsoft.com/office/drawing/2010/main" w="9525">
                 <a:solidFill>
                   <a:srgbClr val="000000"/>
                 </a:solidFill>
@@ -4145,7 +4243,7 @@
               <a:pPr>
                 <a:defRPr/>
               </a:pPr>
-              <a:t>12/7/2015</a:t>
+              <a:t>12/9/2015</a:t>
             </a:fld>
             <a:endParaRPr lang="en-US"/>
           </a:p>
@@ -4275,14 +4373,14 @@
           </a:ln>
           <a:extLst>
             <a:ext uri="{909E8E84-426E-40dd-AFC4-6F175D3DCCD1}">
-              <a14:hiddenFill xmlns:a14="http://schemas.microsoft.com/office/drawing/2010/main" xmlns="">
+              <a14:hiddenFill xmlns="" xmlns:a14="http://schemas.microsoft.com/office/drawing/2010/main">
                 <a:solidFill>
                   <a:srgbClr val="FFFFFF"/>
                 </a:solidFill>
               </a14:hiddenFill>
             </a:ext>
             <a:ext uri="{91240B29-F687-4f45-9708-019B960494DF}">
-              <a14:hiddenLine xmlns:a14="http://schemas.microsoft.com/office/drawing/2010/main" xmlns="" w="9525">
+              <a14:hiddenLine xmlns="" xmlns:a14="http://schemas.microsoft.com/office/drawing/2010/main" w="9525">
                 <a:solidFill>
                   <a:srgbClr val="000000"/>
                 </a:solidFill>
@@ -4508,7 +4606,7 @@
               <a:pPr>
                 <a:defRPr/>
               </a:pPr>
-              <a:t>12/7/2015</a:t>
+              <a:t>12/9/2015</a:t>
             </a:fld>
             <a:endParaRPr lang="en-US"/>
           </a:p>
@@ -4638,14 +4736,14 @@
           </a:ln>
           <a:extLst>
             <a:ext uri="{909E8E84-426E-40dd-AFC4-6F175D3DCCD1}">
-              <a14:hiddenFill xmlns:a14="http://schemas.microsoft.com/office/drawing/2010/main" xmlns="">
+              <a14:hiddenFill xmlns="" xmlns:a14="http://schemas.microsoft.com/office/drawing/2010/main">
                 <a:solidFill>
                   <a:srgbClr val="FFFFFF"/>
                 </a:solidFill>
               </a14:hiddenFill>
             </a:ext>
             <a:ext uri="{91240B29-F687-4f45-9708-019B960494DF}">
-              <a14:hiddenLine xmlns:a14="http://schemas.microsoft.com/office/drawing/2010/main" xmlns="" w="9525">
+              <a14:hiddenLine xmlns="" xmlns:a14="http://schemas.microsoft.com/office/drawing/2010/main" w="9525">
                 <a:solidFill>
                   <a:srgbClr val="000000"/>
                 </a:solidFill>
@@ -4876,7 +4974,7 @@
               <a:pPr>
                 <a:defRPr/>
               </a:pPr>
-              <a:t>12/7/2015</a:t>
+              <a:t>12/9/2015</a:t>
             </a:fld>
             <a:endParaRPr lang="en-US"/>
           </a:p>
@@ -5006,14 +5104,14 @@
           </a:ln>
           <a:extLst>
             <a:ext uri="{909E8E84-426E-40dd-AFC4-6F175D3DCCD1}">
-              <a14:hiddenFill xmlns:a14="http://schemas.microsoft.com/office/drawing/2010/main" xmlns="">
+              <a14:hiddenFill xmlns="" xmlns:a14="http://schemas.microsoft.com/office/drawing/2010/main">
                 <a:solidFill>
                   <a:srgbClr val="FFFFFF"/>
                 </a:solidFill>
               </a14:hiddenFill>
             </a:ext>
             <a:ext uri="{91240B29-F687-4f45-9708-019B960494DF}">
-              <a14:hiddenLine xmlns:a14="http://schemas.microsoft.com/office/drawing/2010/main" xmlns="" w="9525">
+              <a14:hiddenLine xmlns="" xmlns:a14="http://schemas.microsoft.com/office/drawing/2010/main" w="9525">
                 <a:solidFill>
                   <a:srgbClr val="000000"/>
                 </a:solidFill>
@@ -5127,7 +5225,7 @@
               <a:pPr>
                 <a:defRPr/>
               </a:pPr>
-              <a:t>12/7/2015</a:t>
+              <a:t>12/9/2015</a:t>
             </a:fld>
             <a:endParaRPr lang="en-US"/>
           </a:p>
@@ -5252,14 +5350,14 @@
           </a:ln>
           <a:extLst>
             <a:ext uri="{909E8E84-426E-40dd-AFC4-6F175D3DCCD1}">
-              <a14:hiddenFill xmlns:a14="http://schemas.microsoft.com/office/drawing/2010/main" xmlns="">
+              <a14:hiddenFill xmlns="" xmlns:a14="http://schemas.microsoft.com/office/drawing/2010/main">
                 <a:solidFill>
                   <a:srgbClr val="FFFFFF"/>
                 </a:solidFill>
               </a14:hiddenFill>
             </a:ext>
             <a:ext uri="{91240B29-F687-4f45-9708-019B960494DF}">
-              <a14:hiddenLine xmlns:a14="http://schemas.microsoft.com/office/drawing/2010/main" xmlns="" w="9525">
+              <a14:hiddenLine xmlns="" xmlns:a14="http://schemas.microsoft.com/office/drawing/2010/main" w="9525">
                 <a:solidFill>
                   <a:srgbClr val="000000"/>
                 </a:solidFill>
@@ -5383,7 +5481,7 @@
               <a:pPr>
                 <a:defRPr/>
               </a:pPr>
-              <a:t>12/7/2015</a:t>
+              <a:t>12/9/2015</a:t>
             </a:fld>
             <a:endParaRPr lang="en-US"/>
           </a:p>
@@ -5508,14 +5606,14 @@
           </a:ln>
           <a:extLst>
             <a:ext uri="{909E8E84-426E-40dd-AFC4-6F175D3DCCD1}">
-              <a14:hiddenFill xmlns:a14="http://schemas.microsoft.com/office/drawing/2010/main" xmlns="">
+              <a14:hiddenFill xmlns="" xmlns:a14="http://schemas.microsoft.com/office/drawing/2010/main">
                 <a:solidFill>
                   <a:srgbClr val="FFFFFF"/>
                 </a:solidFill>
               </a14:hiddenFill>
             </a:ext>
             <a:ext uri="{91240B29-F687-4f45-9708-019B960494DF}">
-              <a14:hiddenLine xmlns:a14="http://schemas.microsoft.com/office/drawing/2010/main" xmlns="" w="9525">
+              <a14:hiddenLine xmlns="" xmlns:a14="http://schemas.microsoft.com/office/drawing/2010/main" w="9525">
                 <a:solidFill>
                   <a:srgbClr val="000000"/>
                 </a:solidFill>
@@ -5629,7 +5727,7 @@
               <a:pPr>
                 <a:defRPr/>
               </a:pPr>
-              <a:t>12/7/2015</a:t>
+              <a:t>12/9/2015</a:t>
             </a:fld>
             <a:endParaRPr lang="en-US"/>
           </a:p>
@@ -5754,14 +5852,14 @@
           </a:ln>
           <a:extLst>
             <a:ext uri="{909E8E84-426E-40dd-AFC4-6F175D3DCCD1}">
-              <a14:hiddenFill xmlns:a14="http://schemas.microsoft.com/office/drawing/2010/main" xmlns="">
+              <a14:hiddenFill xmlns="" xmlns:a14="http://schemas.microsoft.com/office/drawing/2010/main">
                 <a:solidFill>
                   <a:srgbClr val="FFFFFF"/>
                 </a:solidFill>
               </a14:hiddenFill>
             </a:ext>
             <a:ext uri="{91240B29-F687-4f45-9708-019B960494DF}">
-              <a14:hiddenLine xmlns:a14="http://schemas.microsoft.com/office/drawing/2010/main" xmlns="" w="9525">
+              <a14:hiddenLine xmlns="" xmlns:a14="http://schemas.microsoft.com/office/drawing/2010/main" w="9525">
                 <a:solidFill>
                   <a:srgbClr val="000000"/>
                 </a:solidFill>
@@ -5958,7 +6056,7 @@
               <a:pPr>
                 <a:defRPr/>
               </a:pPr>
-              <a:t>12/7/2015</a:t>
+              <a:t>12/9/2015</a:t>
             </a:fld>
             <a:endParaRPr lang="en-US"/>
           </a:p>
@@ -6083,14 +6181,14 @@
           </a:ln>
           <a:extLst>
             <a:ext uri="{909E8E84-426E-40dd-AFC4-6F175D3DCCD1}">
-              <a14:hiddenFill xmlns:a14="http://schemas.microsoft.com/office/drawing/2010/main" xmlns="">
+              <a14:hiddenFill xmlns="" xmlns:a14="http://schemas.microsoft.com/office/drawing/2010/main">
                 <a:solidFill>
                   <a:srgbClr val="FFFFFF"/>
                 </a:solidFill>
               </a14:hiddenFill>
             </a:ext>
             <a:ext uri="{91240B29-F687-4f45-9708-019B960494DF}">
-              <a14:hiddenLine xmlns:a14="http://schemas.microsoft.com/office/drawing/2010/main" xmlns="" w="9525">
+              <a14:hiddenLine xmlns="" xmlns:a14="http://schemas.microsoft.com/office/drawing/2010/main" w="9525">
                 <a:solidFill>
                   <a:srgbClr val="000000"/>
                 </a:solidFill>
@@ -6326,7 +6424,7 @@
               <a:pPr>
                 <a:defRPr/>
               </a:pPr>
-              <a:t>12/7/2015</a:t>
+              <a:t>12/9/2015</a:t>
             </a:fld>
             <a:endParaRPr lang="en-US"/>
           </a:p>
@@ -6451,14 +6549,14 @@
           </a:ln>
           <a:extLst>
             <a:ext uri="{909E8E84-426E-40dd-AFC4-6F175D3DCCD1}">
-              <a14:hiddenFill xmlns:a14="http://schemas.microsoft.com/office/drawing/2010/main" xmlns="">
+              <a14:hiddenFill xmlns="" xmlns:a14="http://schemas.microsoft.com/office/drawing/2010/main">
                 <a:solidFill>
                   <a:srgbClr val="FFFFFF"/>
                 </a:solidFill>
               </a14:hiddenFill>
             </a:ext>
             <a:ext uri="{91240B29-F687-4f45-9708-019B960494DF}">
-              <a14:hiddenLine xmlns:a14="http://schemas.microsoft.com/office/drawing/2010/main" xmlns="" w="9525">
+              <a14:hiddenLine xmlns="" xmlns:a14="http://schemas.microsoft.com/office/drawing/2010/main" w="9525">
                 <a:solidFill>
                   <a:srgbClr val="000000"/>
                 </a:solidFill>
@@ -6989,7 +7087,7 @@
               <a:pPr>
                 <a:defRPr/>
               </a:pPr>
-              <a:t>12/7/2015</a:t>
+              <a:t>12/9/2015</a:t>
             </a:fld>
             <a:endParaRPr lang="en-US"/>
           </a:p>
@@ -7114,14 +7212,14 @@
           </a:ln>
           <a:extLst>
             <a:ext uri="{909E8E84-426E-40dd-AFC4-6F175D3DCCD1}">
-              <a14:hiddenFill xmlns:a14="http://schemas.microsoft.com/office/drawing/2010/main" xmlns="">
+              <a14:hiddenFill xmlns="" xmlns:a14="http://schemas.microsoft.com/office/drawing/2010/main">
                 <a:solidFill>
                   <a:srgbClr val="FFFFFF"/>
                 </a:solidFill>
               </a14:hiddenFill>
             </a:ext>
             <a:ext uri="{91240B29-F687-4f45-9708-019B960494DF}">
-              <a14:hiddenLine xmlns:a14="http://schemas.microsoft.com/office/drawing/2010/main" xmlns="" w="9525">
+              <a14:hiddenLine xmlns="" xmlns:a14="http://schemas.microsoft.com/office/drawing/2010/main" w="9525">
                 <a:solidFill>
                   <a:srgbClr val="000000"/>
                 </a:solidFill>
@@ -7357,7 +7455,7 @@
               <a:pPr>
                 <a:defRPr/>
               </a:pPr>
-              <a:t>12/7/2015</a:t>
+              <a:t>12/9/2015</a:t>
             </a:fld>
             <a:endParaRPr lang="en-US"/>
           </a:p>
@@ -7482,14 +7580,14 @@
           </a:ln>
           <a:extLst>
             <a:ext uri="{909E8E84-426E-40dd-AFC4-6F175D3DCCD1}">
-              <a14:hiddenFill xmlns:a14="http://schemas.microsoft.com/office/drawing/2010/main" xmlns="">
+              <a14:hiddenFill xmlns="" xmlns:a14="http://schemas.microsoft.com/office/drawing/2010/main">
                 <a:solidFill>
                   <a:srgbClr val="FFFFFF"/>
                 </a:solidFill>
               </a14:hiddenFill>
             </a:ext>
             <a:ext uri="{91240B29-F687-4f45-9708-019B960494DF}">
-              <a14:hiddenLine xmlns:a14="http://schemas.microsoft.com/office/drawing/2010/main" xmlns="" w="9525">
+              <a14:hiddenLine xmlns="" xmlns:a14="http://schemas.microsoft.com/office/drawing/2010/main" w="9525">
                 <a:solidFill>
                   <a:srgbClr val="000000"/>
                 </a:solidFill>
@@ -7812,7 +7910,7 @@
               <a:pPr>
                 <a:defRPr/>
               </a:pPr>
-              <a:t>12/7/2015</a:t>
+              <a:t>12/9/2015</a:t>
             </a:fld>
             <a:endParaRPr lang="en-US"/>
           </a:p>
@@ -7937,14 +8035,14 @@
           </a:ln>
           <a:extLst>
             <a:ext uri="{909E8E84-426E-40dd-AFC4-6F175D3DCCD1}">
-              <a14:hiddenFill xmlns:a14="http://schemas.microsoft.com/office/drawing/2010/main" xmlns="">
+              <a14:hiddenFill xmlns="" xmlns:a14="http://schemas.microsoft.com/office/drawing/2010/main">
                 <a:solidFill>
                   <a:srgbClr val="FFFFFF"/>
                 </a:solidFill>
               </a14:hiddenFill>
             </a:ext>
             <a:ext uri="{91240B29-F687-4f45-9708-019B960494DF}">
-              <a14:hiddenLine xmlns:a14="http://schemas.microsoft.com/office/drawing/2010/main" xmlns="" w="9525">
+              <a14:hiddenLine xmlns="" xmlns:a14="http://schemas.microsoft.com/office/drawing/2010/main" w="9525">
                 <a:solidFill>
                   <a:srgbClr val="000000"/>
                 </a:solidFill>
@@ -8354,7 +8452,7 @@
               <a:pPr>
                 <a:defRPr/>
               </a:pPr>
-              <a:t>12/7/2015</a:t>
+              <a:t>12/9/2015</a:t>
             </a:fld>
             <a:endParaRPr lang="en-US"/>
           </a:p>
@@ -8479,14 +8577,14 @@
           </a:ln>
           <a:extLst>
             <a:ext uri="{909E8E84-426E-40dd-AFC4-6F175D3DCCD1}">
-              <a14:hiddenFill xmlns:a14="http://schemas.microsoft.com/office/drawing/2010/main" xmlns="">
+              <a14:hiddenFill xmlns="" xmlns:a14="http://schemas.microsoft.com/office/drawing/2010/main">
                 <a:solidFill>
                   <a:srgbClr val="FFFFFF"/>
                 </a:solidFill>
               </a14:hiddenFill>
             </a:ext>
             <a:ext uri="{91240B29-F687-4f45-9708-019B960494DF}">
-              <a14:hiddenLine xmlns:a14="http://schemas.microsoft.com/office/drawing/2010/main" xmlns="" w="9525">
+              <a14:hiddenLine xmlns="" xmlns:a14="http://schemas.microsoft.com/office/drawing/2010/main" w="9525">
                 <a:solidFill>
                   <a:srgbClr val="000000"/>
                 </a:solidFill>
@@ -8548,7 +8646,7 @@
               <a:pPr>
                 <a:defRPr/>
               </a:pPr>
-              <a:t>12/7/2015</a:t>
+              <a:t>12/9/2015</a:t>
             </a:fld>
             <a:endParaRPr lang="en-US"/>
           </a:p>
@@ -8735,14 +8833,14 @@
           </a:ln>
           <a:extLst>
             <a:ext uri="{909E8E84-426E-40dd-AFC4-6F175D3DCCD1}">
-              <a14:hiddenFill xmlns:a14="http://schemas.microsoft.com/office/drawing/2010/main" xmlns="">
+              <a14:hiddenFill xmlns="" xmlns:a14="http://schemas.microsoft.com/office/drawing/2010/main">
                 <a:solidFill>
                   <a:srgbClr val="FFFFFF"/>
                 </a:solidFill>
               </a14:hiddenFill>
             </a:ext>
             <a:ext uri="{91240B29-F687-4f45-9708-019B960494DF}">
-              <a14:hiddenLine xmlns:a14="http://schemas.microsoft.com/office/drawing/2010/main" xmlns="" w="9525">
+              <a14:hiddenLine xmlns="" xmlns:a14="http://schemas.microsoft.com/office/drawing/2010/main" w="9525">
                 <a:solidFill>
                   <a:srgbClr val="000000"/>
                 </a:solidFill>
@@ -8793,14 +8891,14 @@
           </a:ln>
           <a:extLst>
             <a:ext uri="{909E8E84-426E-40dd-AFC4-6F175D3DCCD1}">
-              <a14:hiddenFill xmlns:a14="http://schemas.microsoft.com/office/drawing/2010/main" xmlns="">
+              <a14:hiddenFill xmlns="" xmlns:a14="http://schemas.microsoft.com/office/drawing/2010/main">
                 <a:solidFill>
                   <a:srgbClr val="FFFFFF"/>
                 </a:solidFill>
               </a14:hiddenFill>
             </a:ext>
             <a:ext uri="{91240B29-F687-4f45-9708-019B960494DF}">
-              <a14:hiddenLine xmlns:a14="http://schemas.microsoft.com/office/drawing/2010/main" xmlns="" w="9525">
+              <a14:hiddenLine xmlns="" xmlns:a14="http://schemas.microsoft.com/office/drawing/2010/main" w="9525">
                 <a:solidFill>
                   <a:srgbClr val="000000"/>
                 </a:solidFill>
@@ -8903,7 +9001,7 @@
               <a:pPr>
                 <a:defRPr/>
               </a:pPr>
-              <a:t>12/7/2015</a:t>
+              <a:t>12/9/2015</a:t>
             </a:fld>
             <a:endParaRPr lang="en-US"/>
           </a:p>
@@ -9036,14 +9134,14 @@
           </a:ln>
           <a:extLst>
             <a:ext uri="{909E8E84-426E-40dd-AFC4-6F175D3DCCD1}">
-              <a14:hiddenFill xmlns:a14="http://schemas.microsoft.com/office/drawing/2010/main" xmlns="">
+              <a14:hiddenFill xmlns="" xmlns:a14="http://schemas.microsoft.com/office/drawing/2010/main">
                 <a:solidFill>
                   <a:srgbClr val="FFFFFF"/>
                 </a:solidFill>
               </a14:hiddenFill>
             </a:ext>
             <a:ext uri="{91240B29-F687-4f45-9708-019B960494DF}">
-              <a14:hiddenLine xmlns:a14="http://schemas.microsoft.com/office/drawing/2010/main" xmlns="" w="9525">
+              <a14:hiddenLine xmlns="" xmlns:a14="http://schemas.microsoft.com/office/drawing/2010/main" w="9525">
                 <a:solidFill>
                   <a:srgbClr val="000000"/>
                 </a:solidFill>
@@ -9642,14 +9740,14 @@
           </a:ln>
           <a:extLst>
             <a:ext uri="{909E8E84-426E-40dd-AFC4-6F175D3DCCD1}">
-              <a14:hiddenFill xmlns:a14="http://schemas.microsoft.com/office/drawing/2010/main" xmlns="">
+              <a14:hiddenFill xmlns="" xmlns:a14="http://schemas.microsoft.com/office/drawing/2010/main">
                 <a:solidFill>
                   <a:srgbClr val="FFFFFF"/>
                 </a:solidFill>
               </a14:hiddenFill>
             </a:ext>
             <a:ext uri="{91240B29-F687-4f45-9708-019B960494DF}">
-              <a14:hiddenLine xmlns:a14="http://schemas.microsoft.com/office/drawing/2010/main" xmlns="" w="9525">
+              <a14:hiddenLine xmlns="" xmlns:a14="http://schemas.microsoft.com/office/drawing/2010/main" w="9525">
                 <a:solidFill>
                   <a:srgbClr val="000000"/>
                 </a:solidFill>
@@ -9892,7 +9990,7 @@
           <a:p>
             <a:r>
               <a:rPr lang="en-US" dirty="0" smtClean="0"/>
-              <a:t>System Design: Architecture</a:t>
+              <a:t>System Design: Deployment</a:t>
             </a:r>
             <a:endParaRPr lang="en-US" dirty="0"/>
           </a:p>
@@ -9900,13 +9998,9 @@
       </p:sp>
       <p:pic>
         <p:nvPicPr>
-          <p:cNvPr id="4" name="image44.png"/>
-          <p:cNvPicPr>
-            <a:picLocks noGrp="1"/>
-          </p:cNvPicPr>
-          <p:nvPr>
-            <p:ph idx="1"/>
-          </p:nvPr>
+          <p:cNvPr id="4" name="image01.png"/>
+          <p:cNvPicPr/>
+          <p:nvPr/>
         </p:nvPicPr>
         <p:blipFill>
           <a:blip r:embed="rId3"/>
@@ -9917,8 +10011,8 @@
         </p:blipFill>
         <p:spPr>
           <a:xfrm>
-            <a:off x="381000" y="1704975"/>
-            <a:ext cx="3086100" cy="3876675"/>
+            <a:off x="1295400" y="1676400"/>
+            <a:ext cx="5886450" cy="3800475"/>
           </a:xfrm>
           <a:prstGeom prst="rect">
             <a:avLst/>
@@ -9926,106 +10020,10 @@
           <a:ln/>
         </p:spPr>
       </p:pic>
-      <p:pic>
-        <p:nvPicPr>
-          <p:cNvPr id="5" name="image52.png"/>
-          <p:cNvPicPr/>
-          <p:nvPr/>
-        </p:nvPicPr>
-        <p:blipFill>
-          <a:blip r:embed="rId4"/>
-          <a:srcRect/>
-          <a:stretch>
-            <a:fillRect/>
-          </a:stretch>
-        </p:blipFill>
-        <p:spPr>
-          <a:xfrm>
-            <a:off x="2819400" y="2360612"/>
-            <a:ext cx="5943600" cy="2565400"/>
-          </a:xfrm>
-          <a:prstGeom prst="rect">
-            <a:avLst/>
-          </a:prstGeom>
-          <a:ln/>
-        </p:spPr>
-      </p:pic>
-      <p:sp>
-        <p:nvSpPr>
-          <p:cNvPr id="6" name="TextBox 5"/>
-          <p:cNvSpPr txBox="1"/>
-          <p:nvPr/>
-        </p:nvSpPr>
-        <p:spPr>
-          <a:xfrm>
-            <a:off x="533400" y="5581650"/>
-            <a:ext cx="2590800" cy="307777"/>
-          </a:xfrm>
-          <a:prstGeom prst="rect">
-            <a:avLst/>
-          </a:prstGeom>
-          <a:noFill/>
-        </p:spPr>
-        <p:txBody>
-          <a:bodyPr wrap="square" rtlCol="0">
-            <a:spAutoFit/>
-          </a:bodyPr>
-          <a:lstStyle/>
-          <a:p>
-            <a:r>
-              <a:rPr lang="en-US" sz="1400" dirty="0"/>
-              <a:t>Medzmate 3-tier </a:t>
-            </a:r>
-            <a:r>
-              <a:rPr lang="en-US" sz="1400" dirty="0" smtClean="0"/>
-              <a:t>Architecture</a:t>
-            </a:r>
-            <a:endParaRPr lang="en-US" sz="1400" dirty="0"/>
-          </a:p>
-        </p:txBody>
-      </p:sp>
-      <p:sp>
-        <p:nvSpPr>
-          <p:cNvPr id="7" name="TextBox 6"/>
-          <p:cNvSpPr txBox="1"/>
-          <p:nvPr/>
-        </p:nvSpPr>
-        <p:spPr>
-          <a:xfrm>
-            <a:off x="4152900" y="4975741"/>
-            <a:ext cx="3581400" cy="523220"/>
-          </a:xfrm>
-          <a:prstGeom prst="rect">
-            <a:avLst/>
-          </a:prstGeom>
-          <a:noFill/>
-        </p:spPr>
-        <p:txBody>
-          <a:bodyPr wrap="square" rtlCol="0">
-            <a:spAutoFit/>
-          </a:bodyPr>
-          <a:lstStyle/>
-          <a:p>
-            <a:r>
-              <a:rPr lang="en-US" sz="1400" dirty="0" smtClean="0"/>
-              <a:t>Medzmate Station Component </a:t>
-            </a:r>
-            <a:r>
-              <a:rPr lang="en-US" sz="1400" dirty="0"/>
-              <a:t>based </a:t>
-            </a:r>
-            <a:r>
-              <a:rPr lang="en-US" sz="1400" dirty="0" smtClean="0"/>
-              <a:t>architecture.</a:t>
-            </a:r>
-            <a:endParaRPr lang="en-US" sz="1400" dirty="0"/>
-          </a:p>
-        </p:txBody>
-      </p:sp>
     </p:spTree>
     <p:extLst>
       <p:ext uri="{BB962C8B-B14F-4D97-AF65-F5344CB8AC3E}">
-        <p14:creationId xmlns:p14="http://schemas.microsoft.com/office/powerpoint/2010/main" val="4211570898"/>
+        <p14:creationId xmlns:p14="http://schemas.microsoft.com/office/powerpoint/2010/main" val="2858691249"/>
       </p:ext>
     </p:extLst>
   </p:cSld>
@@ -10076,40 +10074,85 @@
           <a:p>
             <a:r>
               <a:rPr lang="en-US" dirty="0" smtClean="0"/>
-              <a:t>System Design: Deployment</a:t>
+              <a:t>System Design</a:t>
             </a:r>
             <a:endParaRPr lang="en-US" dirty="0"/>
           </a:p>
         </p:txBody>
       </p:sp>
-      <p:pic>
-        <p:nvPicPr>
-          <p:cNvPr id="4" name="image01.png"/>
-          <p:cNvPicPr/>
-          <p:nvPr/>
-        </p:nvPicPr>
-        <p:blipFill>
-          <a:blip r:embed="rId3"/>
-          <a:srcRect/>
-          <a:stretch>
-            <a:fillRect/>
-          </a:stretch>
-        </p:blipFill>
-        <p:spPr>
-          <a:xfrm>
-            <a:off x="1295400" y="1676400"/>
-            <a:ext cx="5886450" cy="3800475"/>
-          </a:xfrm>
-          <a:prstGeom prst="rect">
-            <a:avLst/>
-          </a:prstGeom>
-          <a:ln/>
-        </p:spPr>
-      </p:pic>
+      <p:sp>
+        <p:nvSpPr>
+          <p:cNvPr id="3" name="Content Placeholder 2"/>
+          <p:cNvSpPr>
+            <a:spLocks noGrp="1"/>
+          </p:cNvSpPr>
+          <p:nvPr>
+            <p:ph idx="1"/>
+          </p:nvPr>
+        </p:nvSpPr>
+        <p:spPr/>
+        <p:txBody>
+          <a:bodyPr/>
+          <a:lstStyle/>
+          <a:p>
+            <a:r>
+              <a:rPr lang="en-US" dirty="0"/>
+              <a:t>Persistent data </a:t>
+            </a:r>
+            <a:r>
+              <a:rPr lang="en-US" dirty="0" smtClean="0"/>
+              <a:t>design</a:t>
+            </a:r>
+          </a:p>
+          <a:p>
+            <a:pPr lvl="1"/>
+            <a:r>
+              <a:rPr lang="en-US" dirty="0" smtClean="0"/>
+              <a:t>Format: JSON files.</a:t>
+            </a:r>
+          </a:p>
+          <a:p>
+            <a:pPr lvl="1"/>
+            <a:r>
+              <a:rPr lang="en-US" dirty="0" smtClean="0"/>
+              <a:t>Storage: </a:t>
+            </a:r>
+            <a:r>
+              <a:rPr lang="en-US" dirty="0" err="1" smtClean="0"/>
+              <a:t>Raspbian</a:t>
+            </a:r>
+            <a:r>
+              <a:rPr lang="en-US" dirty="0" smtClean="0"/>
+              <a:t> file system.</a:t>
+            </a:r>
+          </a:p>
+          <a:p>
+            <a:pPr lvl="1"/>
+            <a:r>
+              <a:rPr lang="en-US" dirty="0" smtClean="0"/>
+              <a:t>Storage: Android file system.</a:t>
+            </a:r>
+          </a:p>
+          <a:p>
+            <a:r>
+              <a:rPr lang="en-US" dirty="0" smtClean="0"/>
+              <a:t>Security/Privacy</a:t>
+            </a:r>
+          </a:p>
+          <a:p>
+            <a:pPr lvl="1"/>
+            <a:r>
+              <a:rPr lang="en-US" dirty="0" smtClean="0"/>
+              <a:t>Initial version Medzmate 1.0 will not take in consideration security as a paramount feature.</a:t>
+            </a:r>
+            <a:endParaRPr lang="en-US" dirty="0"/>
+          </a:p>
+        </p:txBody>
+      </p:sp>
     </p:spTree>
     <p:extLst>
       <p:ext uri="{BB962C8B-B14F-4D97-AF65-F5344CB8AC3E}">
-        <p14:creationId xmlns:p14="http://schemas.microsoft.com/office/powerpoint/2010/main" val="2858691249"/>
+        <p14:creationId xmlns:p14="http://schemas.microsoft.com/office/powerpoint/2010/main" val="2596639212"/>
       </p:ext>
     </p:extLst>
   </p:cSld>
@@ -10160,85 +10203,40 @@
           <a:p>
             <a:r>
               <a:rPr lang="en-US" dirty="0" smtClean="0"/>
-              <a:t>System Design</a:t>
+              <a:t>Class Diagram</a:t>
             </a:r>
             <a:endParaRPr lang="en-US" dirty="0"/>
           </a:p>
         </p:txBody>
       </p:sp>
-      <p:sp>
-        <p:nvSpPr>
-          <p:cNvPr id="3" name="Content Placeholder 2"/>
-          <p:cNvSpPr>
-            <a:spLocks noGrp="1"/>
-          </p:cNvSpPr>
-          <p:nvPr>
-            <p:ph idx="1"/>
-          </p:nvPr>
-        </p:nvSpPr>
-        <p:spPr/>
-        <p:txBody>
-          <a:bodyPr/>
-          <a:lstStyle/>
-          <a:p>
-            <a:r>
-              <a:rPr lang="en-US" dirty="0"/>
-              <a:t>Persistent data </a:t>
-            </a:r>
-            <a:r>
-              <a:rPr lang="en-US" dirty="0" smtClean="0"/>
-              <a:t>design</a:t>
-            </a:r>
-          </a:p>
-          <a:p>
-            <a:pPr lvl="1"/>
-            <a:r>
-              <a:rPr lang="en-US" dirty="0" smtClean="0"/>
-              <a:t>Format: JSON files.</a:t>
-            </a:r>
-          </a:p>
-          <a:p>
-            <a:pPr lvl="1"/>
-            <a:r>
-              <a:rPr lang="en-US" dirty="0" smtClean="0"/>
-              <a:t>Storage: </a:t>
-            </a:r>
-            <a:r>
-              <a:rPr lang="en-US" dirty="0" err="1" smtClean="0"/>
-              <a:t>Raspbian</a:t>
-            </a:r>
-            <a:r>
-              <a:rPr lang="en-US" dirty="0" smtClean="0"/>
-              <a:t> file system.</a:t>
-            </a:r>
-          </a:p>
-          <a:p>
-            <a:pPr lvl="1"/>
-            <a:r>
-              <a:rPr lang="en-US" dirty="0" smtClean="0"/>
-              <a:t>Storage: Android file system.</a:t>
-            </a:r>
-          </a:p>
-          <a:p>
-            <a:r>
-              <a:rPr lang="en-US" dirty="0" smtClean="0"/>
-              <a:t>Security/Privacy</a:t>
-            </a:r>
-          </a:p>
-          <a:p>
-            <a:pPr lvl="1"/>
-            <a:r>
-              <a:rPr lang="en-US" dirty="0" smtClean="0"/>
-              <a:t>Initial version Medzmate 1.0 will not take in consideration security as a paramount feature.</a:t>
-            </a:r>
-            <a:endParaRPr lang="en-US" dirty="0"/>
-          </a:p>
-        </p:txBody>
-      </p:sp>
+      <p:pic>
+        <p:nvPicPr>
+          <p:cNvPr id="4" name="image25.png"/>
+          <p:cNvPicPr/>
+          <p:nvPr/>
+        </p:nvPicPr>
+        <p:blipFill>
+          <a:blip r:embed="rId3"/>
+          <a:srcRect/>
+          <a:stretch>
+            <a:fillRect/>
+          </a:stretch>
+        </p:blipFill>
+        <p:spPr>
+          <a:xfrm>
+            <a:off x="1905000" y="1425575"/>
+            <a:ext cx="5486400" cy="4518026"/>
+          </a:xfrm>
+          <a:prstGeom prst="rect">
+            <a:avLst/>
+          </a:prstGeom>
+          <a:ln/>
+        </p:spPr>
+      </p:pic>
     </p:spTree>
     <p:extLst>
       <p:ext uri="{BB962C8B-B14F-4D97-AF65-F5344CB8AC3E}">
-        <p14:creationId xmlns:p14="http://schemas.microsoft.com/office/powerpoint/2010/main" val="2596639212"/>
+        <p14:creationId xmlns:p14="http://schemas.microsoft.com/office/powerpoint/2010/main" val="2453098138"/>
       </p:ext>
     </p:extLst>
   </p:cSld>
@@ -10289,40 +10287,73 @@
           <a:p>
             <a:r>
               <a:rPr lang="en-US" dirty="0" smtClean="0"/>
-              <a:t>Class Diagram</a:t>
+              <a:t>Design Patterns</a:t>
             </a:r>
             <a:endParaRPr lang="en-US" dirty="0"/>
           </a:p>
         </p:txBody>
       </p:sp>
-      <p:pic>
-        <p:nvPicPr>
-          <p:cNvPr id="4" name="image25.png"/>
-          <p:cNvPicPr/>
-          <p:nvPr/>
-        </p:nvPicPr>
-        <p:blipFill>
-          <a:blip r:embed="rId3"/>
-          <a:srcRect/>
-          <a:stretch>
-            <a:fillRect/>
-          </a:stretch>
-        </p:blipFill>
-        <p:spPr>
-          <a:xfrm>
-            <a:off x="1905000" y="1425575"/>
-            <a:ext cx="5486400" cy="4518026"/>
-          </a:xfrm>
-          <a:prstGeom prst="rect">
-            <a:avLst/>
-          </a:prstGeom>
-          <a:ln/>
-        </p:spPr>
-      </p:pic>
+      <p:sp>
+        <p:nvSpPr>
+          <p:cNvPr id="3" name="Content Placeholder 2"/>
+          <p:cNvSpPr>
+            <a:spLocks noGrp="1"/>
+          </p:cNvSpPr>
+          <p:nvPr>
+            <p:ph idx="1"/>
+          </p:nvPr>
+        </p:nvSpPr>
+        <p:spPr/>
+        <p:txBody>
+          <a:bodyPr/>
+          <a:lstStyle/>
+          <a:p>
+            <a:r>
+              <a:rPr lang="en-US" i="1" dirty="0" smtClean="0"/>
+              <a:t>Behavioral Patterns</a:t>
+            </a:r>
+          </a:p>
+          <a:p>
+            <a:pPr lvl="1"/>
+            <a:r>
+              <a:rPr lang="en-US" dirty="0" smtClean="0"/>
+              <a:t>Observer or Publish-Subscribe</a:t>
+            </a:r>
+          </a:p>
+          <a:p>
+            <a:pPr lvl="1"/>
+            <a:r>
+              <a:rPr lang="en-US" dirty="0" smtClean="0"/>
+              <a:t>Interpreter</a:t>
+            </a:r>
+          </a:p>
+          <a:p>
+            <a:pPr lvl="1"/>
+            <a:r>
+              <a:rPr lang="en-US" dirty="0" smtClean="0"/>
+              <a:t>Iterator</a:t>
+            </a:r>
+          </a:p>
+          <a:p>
+            <a:r>
+              <a:rPr lang="en-US" i="1" dirty="0" smtClean="0"/>
+              <a:t>Structural Patterns</a:t>
+            </a:r>
+          </a:p>
+          <a:p>
+            <a:pPr lvl="1"/>
+            <a:r>
+              <a:rPr lang="en-US" dirty="0" smtClean="0"/>
+              <a:t>Facade</a:t>
+            </a:r>
+            <a:endParaRPr lang="en-US" dirty="0"/>
+          </a:p>
+        </p:txBody>
+      </p:sp>
     </p:spTree>
     <p:extLst>
       <p:ext uri="{BB962C8B-B14F-4D97-AF65-F5344CB8AC3E}">
-        <p14:creationId xmlns:p14="http://schemas.microsoft.com/office/powerpoint/2010/main" val="2453098138"/>
+        <p14:creationId xmlns:p14="http://schemas.microsoft.com/office/powerpoint/2010/main" val="4232587713"/>
       </p:ext>
     </p:extLst>
   </p:cSld>
@@ -10366,14 +10397,23 @@
             <p:ph type="title"/>
           </p:nvPr>
         </p:nvSpPr>
-        <p:spPr/>
+        <p:spPr>
+          <a:xfrm>
+            <a:off x="779463" y="381000"/>
+            <a:ext cx="8135937" cy="1044575"/>
+          </a:xfrm>
+        </p:spPr>
         <p:txBody>
           <a:bodyPr/>
           <a:lstStyle/>
           <a:p>
             <a:r>
+              <a:rPr lang="en-US" dirty="0"/>
+              <a:t>Main </a:t>
+            </a:r>
+            <a:r>
               <a:rPr lang="en-US" dirty="0" smtClean="0"/>
-              <a:t>Design Patterns</a:t>
+              <a:t>algorithms </a:t>
             </a:r>
             <a:endParaRPr lang="en-US" dirty="0"/>
           </a:p>
@@ -10395,51 +10435,165 @@
           <a:lstStyle/>
           <a:p>
             <a:r>
-              <a:rPr lang="en-US" i="1" dirty="0" smtClean="0"/>
-              <a:t>Behavioral Patterns</a:t>
-            </a:r>
-          </a:p>
-          <a:p>
-            <a:pPr lvl="1"/>
+              <a:rPr lang="en-US" sz="2000" dirty="0">
+                <a:cs typeface="+mn-cs"/>
+              </a:rPr>
+              <a:t>Scheduler algorithm()</a:t>
+            </a:r>
+          </a:p>
+          <a:p>
+            <a:pPr marL="739775" lvl="1" indent="-457200">
+              <a:buFont typeface="+mj-lt"/>
+              <a:buAutoNum type="arabicPeriod"/>
+            </a:pPr>
+            <a:r>
+              <a:rPr lang="en-US" dirty="0"/>
+              <a:t>WHILE (true) </a:t>
+            </a:r>
+          </a:p>
+          <a:p>
+            <a:pPr marL="739775" lvl="1" indent="-457200">
+              <a:buFont typeface="+mj-lt"/>
+              <a:buAutoNum type="arabicPeriod"/>
+            </a:pPr>
+            <a:r>
+              <a:rPr lang="en-US" dirty="0"/>
+              <a:t>     IF </a:t>
+            </a:r>
+            <a:r>
+              <a:rPr lang="en-US" dirty="0" err="1"/>
+              <a:t>IsTime</a:t>
+            </a:r>
+            <a:r>
+              <a:rPr lang="en-US" dirty="0"/>
+              <a:t>() THEN </a:t>
+            </a:r>
+            <a:r>
+              <a:rPr lang="en-US" dirty="0" err="1"/>
+              <a:t>ThrowDispensingEvent</a:t>
+            </a:r>
             <a:r>
               <a:rPr lang="en-US" dirty="0" smtClean="0"/>
-              <a:t>Observer or Publish-Subscribe</a:t>
-            </a:r>
-          </a:p>
-          <a:p>
-            <a:pPr lvl="1"/>
+              <a:t>()</a:t>
+            </a:r>
+          </a:p>
+          <a:p>
+            <a:pPr marL="739775" lvl="1" indent="-457200">
+              <a:buFont typeface="+mj-lt"/>
+              <a:buAutoNum type="arabicPeriod"/>
+            </a:pPr>
             <a:r>
               <a:rPr lang="en-US" dirty="0" smtClean="0"/>
-              <a:t>Interpreter</a:t>
-            </a:r>
-          </a:p>
-          <a:p>
-            <a:pPr lvl="1"/>
+              <a:t>END</a:t>
+            </a:r>
+          </a:p>
+          <a:p>
+            <a:pPr marL="444500" indent="-457200"/>
+            <a:r>
+              <a:rPr lang="en-US" sz="2200" dirty="0" err="1" smtClean="0">
+                <a:cs typeface="+mn-cs"/>
+              </a:rPr>
+              <a:t>IsTime</a:t>
+            </a:r>
+            <a:r>
+              <a:rPr lang="en-US" sz="2200" dirty="0" smtClean="0">
+                <a:cs typeface="+mn-cs"/>
+              </a:rPr>
+              <a:t> </a:t>
+            </a:r>
+            <a:r>
+              <a:rPr lang="en-US" sz="2200" dirty="0">
+                <a:cs typeface="+mn-cs"/>
+              </a:rPr>
+              <a:t>()</a:t>
+            </a:r>
+          </a:p>
+          <a:p>
+            <a:pPr marL="739775" lvl="1" indent="-457200">
+              <a:buFont typeface="+mj-lt"/>
+              <a:buAutoNum type="arabicPeriod"/>
+            </a:pPr>
+            <a:r>
+              <a:rPr lang="en-US" dirty="0"/>
+              <a:t>FOREACH straw s</a:t>
+            </a:r>
+          </a:p>
+          <a:p>
+            <a:pPr marL="739775" lvl="1" indent="-457200">
+              <a:buFont typeface="+mj-lt"/>
+              <a:buAutoNum type="arabicPeriod"/>
+            </a:pPr>
+            <a:r>
+              <a:rPr lang="en-US" dirty="0"/>
+              <a:t>     IF </a:t>
+            </a:r>
+            <a:r>
+              <a:rPr lang="en-US" dirty="0" err="1"/>
+              <a:t>s.DispensesOnTime</a:t>
+            </a:r>
+            <a:r>
+              <a:rPr lang="en-US" dirty="0"/>
+              <a:t>( </a:t>
+            </a:r>
+            <a:r>
+              <a:rPr lang="en-US" dirty="0" err="1"/>
+              <a:t>getComputerTime</a:t>
+            </a:r>
+            <a:r>
+              <a:rPr lang="en-US" dirty="0"/>
+              <a:t>())</a:t>
+            </a:r>
+          </a:p>
+          <a:p>
+            <a:pPr marL="739775" lvl="1" indent="-457200">
+              <a:buFont typeface="+mj-lt"/>
+              <a:buAutoNum type="arabicPeriod"/>
+            </a:pPr>
+            <a:r>
+              <a:rPr lang="en-US" dirty="0"/>
+              <a:t>             RETURN </a:t>
+            </a:r>
             <a:r>
               <a:rPr lang="en-US" dirty="0" smtClean="0"/>
-              <a:t>Iterator</a:t>
-            </a:r>
-          </a:p>
-          <a:p>
-            <a:r>
-              <a:rPr lang="en-US" i="1" dirty="0" smtClean="0"/>
-              <a:t>Structural Patterns</a:t>
-            </a:r>
-          </a:p>
-          <a:p>
-            <a:pPr lvl="1"/>
+              <a:t>TRUE</a:t>
+            </a:r>
+          </a:p>
+          <a:p>
+            <a:pPr marL="739775" lvl="1" indent="-457200">
+              <a:buFont typeface="+mj-lt"/>
+              <a:buAutoNum type="arabicPeriod"/>
+            </a:pPr>
+            <a:r>
+              <a:rPr lang="en-US" sz="2000" dirty="0"/>
+              <a:t> </a:t>
+            </a:r>
+            <a:r>
+              <a:rPr lang="en-US" sz="2000" dirty="0" smtClean="0"/>
+              <a:t>    ELSE </a:t>
+            </a:r>
+            <a:r>
+              <a:rPr lang="en-US" sz="2000" dirty="0"/>
+              <a:t>RETURN FALSE </a:t>
+            </a:r>
+            <a:endParaRPr lang="en-US" sz="2000" dirty="0" smtClean="0"/>
+          </a:p>
+          <a:p>
+            <a:pPr marL="739775" lvl="1" indent="-457200">
+              <a:buFont typeface="+mj-lt"/>
+              <a:buAutoNum type="arabicPeriod"/>
+            </a:pPr>
             <a:r>
               <a:rPr lang="en-US" dirty="0" smtClean="0"/>
-              <a:t>Facade</a:t>
-            </a:r>
-            <a:endParaRPr lang="en-US" dirty="0"/>
+              <a:t>END</a:t>
+            </a:r>
+            <a:endParaRPr lang="en-US" sz="2000" dirty="0"/>
           </a:p>
         </p:txBody>
       </p:sp>
     </p:spTree>
     <p:extLst>
       <p:ext uri="{BB962C8B-B14F-4D97-AF65-F5344CB8AC3E}">
-        <p14:creationId xmlns:p14="http://schemas.microsoft.com/office/powerpoint/2010/main" val="4232587713"/>
+        <p14:creationId xmlns:p14="http://schemas.microsoft.com/office/powerpoint/2010/main" val="35682116"/>
       </p:ext>
     </p:extLst>
   </p:cSld>
@@ -10521,10 +10675,8 @@
           <a:lstStyle/>
           <a:p>
             <a:r>
-              <a:rPr lang="en-US" sz="2000" dirty="0">
-                <a:cs typeface="+mn-cs"/>
-              </a:rPr>
-              <a:t>Scheduler algorithm()</a:t>
+              <a:rPr lang="en-US" dirty="0" smtClean="0"/>
+              <a:t>Recursive descent parser algorithm:</a:t>
             </a:r>
           </a:p>
           <a:p>
@@ -10534,8 +10686,13 @@
             </a:pPr>
             <a:r>
               <a:rPr lang="en-US" dirty="0"/>
-              <a:t>WHILE (true) </a:t>
-            </a:r>
+              <a:t>JSON ::= ‘[‘ </a:t>
+            </a:r>
+            <a:r>
+              <a:rPr lang="en-US" dirty="0" err="1"/>
+              <a:t>PropertyArray</a:t>
+            </a:r>
+            <a:endParaRPr lang="en-US" dirty="0"/>
           </a:p>
           <a:p>
             <a:pPr marL="739775" lvl="1" indent="-457200">
@@ -10543,24 +10700,12 @@
               <a:buAutoNum type="arabicPeriod"/>
             </a:pPr>
             <a:r>
+              <a:rPr lang="en-US" dirty="0" err="1"/>
+              <a:t>PropertyArray</a:t>
+            </a:r>
+            <a:r>
               <a:rPr lang="en-US" dirty="0"/>
-              <a:t>     IF </a:t>
-            </a:r>
-            <a:r>
-              <a:rPr lang="en-US" dirty="0" err="1"/>
-              <a:t>IsTime</a:t>
-            </a:r>
-            <a:r>
-              <a:rPr lang="en-US" dirty="0"/>
-              <a:t>() THEN </a:t>
-            </a:r>
-            <a:r>
-              <a:rPr lang="en-US" dirty="0" err="1"/>
-              <a:t>ThrowDispensingEvent</a:t>
-            </a:r>
-            <a:r>
-              <a:rPr lang="en-US" dirty="0" smtClean="0"/>
-              <a:t>()</a:t>
+              <a:t>::=  Property  Properties</a:t>
             </a:r>
           </a:p>
           <a:p>
@@ -10569,29 +10714,8 @@
               <a:buAutoNum type="arabicPeriod"/>
             </a:pPr>
             <a:r>
-              <a:rPr lang="en-US" dirty="0" smtClean="0"/>
-              <a:t>END</a:t>
-            </a:r>
-          </a:p>
-          <a:p>
-            <a:pPr marL="444500" indent="-457200"/>
-            <a:r>
-              <a:rPr lang="en-US" sz="2200" dirty="0" err="1" smtClean="0">
-                <a:cs typeface="+mn-cs"/>
-              </a:rPr>
-              <a:t>IsTime</a:t>
-            </a:r>
-            <a:r>
-              <a:rPr lang="en-US" sz="2200" dirty="0" smtClean="0">
-                <a:cs typeface="+mn-cs"/>
-              </a:rPr>
-              <a:t> </a:t>
-            </a:r>
-            <a:r>
-              <a:rPr lang="en-US" sz="2200" dirty="0">
-                <a:cs typeface="+mn-cs"/>
-              </a:rPr>
-              <a:t>()</a:t>
+              <a:rPr lang="en-US" dirty="0"/>
+              <a:t>Properties ::= ‘,’ Property Properties | ‘]’</a:t>
             </a:r>
           </a:p>
           <a:p>
@@ -10601,8 +10725,13 @@
             </a:pPr>
             <a:r>
               <a:rPr lang="en-US" dirty="0"/>
-              <a:t>FOREACH straw s</a:t>
-            </a:r>
+              <a:t>Property ::= ‘{‘ </a:t>
+            </a:r>
+            <a:r>
+              <a:rPr lang="en-US" dirty="0" err="1"/>
+              <a:t>NameValuePair</a:t>
+            </a:r>
+            <a:endParaRPr lang="en-US" dirty="0"/>
           </a:p>
           <a:p>
             <a:pPr marL="739775" lvl="1" indent="-457200">
@@ -10610,76 +10739,25 @@
               <a:buAutoNum type="arabicPeriod"/>
             </a:pPr>
             <a:r>
+              <a:rPr lang="en-US" dirty="0" err="1"/>
+              <a:t>NameValuePair</a:t>
+            </a:r>
+            <a:r>
               <a:rPr lang="en-US" dirty="0"/>
-              <a:t>     IF </a:t>
-            </a:r>
-            <a:r>
-              <a:rPr lang="en-US" dirty="0" err="1"/>
-              <a:t>s.DispensesOnTime</a:t>
-            </a:r>
-            <a:r>
-              <a:rPr lang="en-US" dirty="0"/>
-              <a:t>( </a:t>
-            </a:r>
-            <a:r>
-              <a:rPr lang="en-US" dirty="0" err="1"/>
-              <a:t>getComputerTime</a:t>
-            </a:r>
-            <a:r>
-              <a:rPr lang="en-US" dirty="0"/>
-              <a:t>())</a:t>
-            </a:r>
-          </a:p>
-          <a:p>
-            <a:pPr marL="739775" lvl="1" indent="-457200">
-              <a:buFont typeface="+mj-lt"/>
-              <a:buAutoNum type="arabicPeriod"/>
-            </a:pPr>
-            <a:r>
-              <a:rPr lang="en-US" dirty="0"/>
-              <a:t>             RETURN </a:t>
+              <a:t> ::= ‘ “name” :’ alphanumeric ‘,’ ‘ “value” :’ alphanumeric </a:t>
             </a:r>
             <a:r>
               <a:rPr lang="en-US" dirty="0" smtClean="0"/>
-              <a:t>TRUE</a:t>
-            </a:r>
-          </a:p>
-          <a:p>
-            <a:pPr marL="739775" lvl="1" indent="-457200">
-              <a:buFont typeface="+mj-lt"/>
-              <a:buAutoNum type="arabicPeriod"/>
-            </a:pPr>
-            <a:r>
-              <a:rPr lang="en-US" sz="2000" dirty="0"/>
-              <a:t> </a:t>
-            </a:r>
-            <a:r>
-              <a:rPr lang="en-US" sz="2000" dirty="0" smtClean="0"/>
-              <a:t>    ELSE </a:t>
-            </a:r>
-            <a:r>
-              <a:rPr lang="en-US" sz="2000" dirty="0"/>
-              <a:t>RETURN FALSE </a:t>
-            </a:r>
-            <a:endParaRPr lang="en-US" sz="2000" dirty="0" smtClean="0"/>
-          </a:p>
-          <a:p>
-            <a:pPr marL="739775" lvl="1" indent="-457200">
-              <a:buFont typeface="+mj-lt"/>
-              <a:buAutoNum type="arabicPeriod"/>
-            </a:pPr>
-            <a:r>
-              <a:rPr lang="en-US" dirty="0" smtClean="0"/>
-              <a:t>END</a:t>
-            </a:r>
-            <a:endParaRPr lang="en-US" sz="2000" dirty="0"/>
+              <a:t>‘}’</a:t>
+            </a:r>
+            <a:endParaRPr lang="en-US" dirty="0"/>
           </a:p>
         </p:txBody>
       </p:sp>
     </p:spTree>
     <p:extLst>
       <p:ext uri="{BB962C8B-B14F-4D97-AF65-F5344CB8AC3E}">
-        <p14:creationId xmlns:p14="http://schemas.microsoft.com/office/powerpoint/2010/main" val="35682116"/>
+        <p14:creationId xmlns:p14="http://schemas.microsoft.com/office/powerpoint/2010/main" val="2853038491"/>
       </p:ext>
     </p:extLst>
   </p:cSld>
@@ -10723,23 +10801,18 @@
             <p:ph type="title"/>
           </p:nvPr>
         </p:nvSpPr>
-        <p:spPr>
-          <a:xfrm>
-            <a:off x="779463" y="381000"/>
-            <a:ext cx="8135937" cy="1044575"/>
-          </a:xfrm>
-        </p:spPr>
+        <p:spPr/>
         <p:txBody>
           <a:bodyPr/>
           <a:lstStyle/>
           <a:p>
             <a:r>
               <a:rPr lang="en-US" dirty="0"/>
-              <a:t>Main </a:t>
+              <a:t>Test Suites and Test </a:t>
             </a:r>
             <a:r>
               <a:rPr lang="en-US" dirty="0" smtClean="0"/>
-              <a:t>algorithms </a:t>
+              <a:t>Cases</a:t>
             </a:r>
             <a:endParaRPr lang="en-US" dirty="0"/>
           </a:p>
@@ -10747,103 +10820,266 @@
       </p:sp>
       <p:sp>
         <p:nvSpPr>
-          <p:cNvPr id="3" name="Content Placeholder 2"/>
-          <p:cNvSpPr>
-            <a:spLocks noGrp="1"/>
-          </p:cNvSpPr>
-          <p:nvPr>
-            <p:ph idx="1"/>
-          </p:nvPr>
-        </p:nvSpPr>
-        <p:spPr/>
-        <p:txBody>
-          <a:bodyPr/>
+          <p:cNvPr id="3" name="Rectangle 2"/>
+          <p:cNvSpPr/>
+          <p:nvPr/>
+        </p:nvSpPr>
+        <p:spPr>
+          <a:xfrm>
+            <a:off x="488294" y="1409976"/>
+            <a:ext cx="8165824" cy="5447645"/>
+          </a:xfrm>
+          <a:prstGeom prst="rect">
+            <a:avLst/>
+          </a:prstGeom>
+        </p:spPr>
+        <p:txBody>
+          <a:bodyPr wrap="square">
+            <a:spAutoFit/>
+          </a:bodyPr>
           <a:lstStyle/>
           <a:p>
             <a:r>
-              <a:rPr lang="en-US" dirty="0" smtClean="0"/>
-              <a:t>Recursive descent parser algorithm:</a:t>
-            </a:r>
-          </a:p>
-          <a:p>
-            <a:pPr marL="739775" lvl="1" indent="-457200">
+              <a:rPr lang="en-US" sz="2400" b="1" dirty="0" smtClean="0"/>
+              <a:t>U. Story </a:t>
+            </a:r>
+            <a:r>
+              <a:rPr lang="en-US" sz="2400" b="1" dirty="0"/>
+              <a:t># 002 Add new medicine detailed </a:t>
+            </a:r>
+            <a:r>
+              <a:rPr lang="en-US" sz="2400" b="1" dirty="0" smtClean="0"/>
+              <a:t>information</a:t>
+            </a:r>
+            <a:r>
+              <a:rPr lang="en-US" sz="1200" dirty="0">
+                <a:solidFill>
+                  <a:srgbClr val="000000"/>
+                </a:solidFill>
+                <a:latin typeface="Arial" panose="020B0604020202020204" pitchFamily="34" charset="0"/>
+                <a:ea typeface="Times New Roman" panose="02020603050405020304" pitchFamily="18" charset="0"/>
+                <a:cs typeface="Arial" panose="020B0604020202020204" pitchFamily="34" charset="0"/>
+              </a:rPr>
+              <a:t> </a:t>
+            </a:r>
+          </a:p>
+          <a:p>
+            <a:pPr marL="342900" lvl="0" indent="-342900">
+              <a:buFont typeface="Arial" panose="020B0604020202020204" pitchFamily="34" charset="0"/>
+              <a:buChar char="●"/>
+            </a:pPr>
+            <a:endParaRPr lang="en-US" b="1" dirty="0" smtClean="0">
+              <a:latin typeface="Arial" panose="020B0604020202020204" pitchFamily="34" charset="0"/>
+              <a:ea typeface="Arial" panose="020B0604020202020204" pitchFamily="34" charset="0"/>
+              <a:cs typeface="Arial" panose="020B0604020202020204" pitchFamily="34" charset="0"/>
+            </a:endParaRPr>
+          </a:p>
+          <a:p>
+            <a:pPr lvl="0"/>
+            <a:r>
+              <a:rPr lang="en-US" b="1" dirty="0"/>
+              <a:t>Test 002C – </a:t>
+            </a:r>
+            <a:r>
+              <a:rPr lang="en-US" b="1" dirty="0"/>
+              <a:t>Verify user can Submit data.</a:t>
+            </a:r>
+            <a:endParaRPr lang="en-US" dirty="0"/>
+          </a:p>
+          <a:p>
+            <a:r>
+              <a:rPr lang="en-US" b="1" dirty="0"/>
+              <a:t>        </a:t>
+            </a:r>
+            <a:r>
+              <a:rPr lang="en-US" b="1" dirty="0" smtClean="0"/>
+              <a:t>Preconditions</a:t>
+            </a:r>
+            <a:r>
+              <a:rPr lang="en-US" b="1" dirty="0"/>
+              <a:t>:</a:t>
+            </a:r>
+            <a:endParaRPr lang="en-US" dirty="0"/>
+          </a:p>
+          <a:p>
+            <a:pPr marL="1257300" lvl="2" indent="-342900">
               <a:buFont typeface="+mj-lt"/>
               <a:buAutoNum type="arabicPeriod"/>
             </a:pPr>
             <a:r>
+              <a:rPr lang="en-US" dirty="0" smtClean="0"/>
+              <a:t>User </a:t>
+            </a:r>
+            <a:r>
               <a:rPr lang="en-US" dirty="0"/>
-              <a:t>JSON ::= ‘[‘ </a:t>
-            </a:r>
-            <a:r>
-              <a:rPr lang="en-US" dirty="0" err="1"/>
-              <a:t>PropertyArray</a:t>
+              <a:t>must be on medicine detailed information </a:t>
+            </a:r>
+            <a:r>
+              <a:rPr lang="en-US" dirty="0" smtClean="0"/>
+              <a:t>form</a:t>
+            </a:r>
+          </a:p>
+          <a:p>
+            <a:pPr lvl="0"/>
+            <a:r>
+              <a:rPr lang="en-US" dirty="0" smtClean="0"/>
+              <a:t>        </a:t>
+            </a:r>
+            <a:r>
+              <a:rPr lang="en-US" b="1" dirty="0" smtClean="0"/>
+              <a:t>Input </a:t>
+            </a:r>
+            <a:r>
+              <a:rPr lang="en-US" b="1" dirty="0"/>
+              <a:t>Data:</a:t>
             </a:r>
             <a:endParaRPr lang="en-US" dirty="0"/>
           </a:p>
           <a:p>
-            <a:pPr marL="739775" lvl="1" indent="-457200">
+            <a:pPr marL="1257300" lvl="2" indent="-342900">
               <a:buFont typeface="+mj-lt"/>
               <a:buAutoNum type="arabicPeriod"/>
             </a:pPr>
             <a:r>
-              <a:rPr lang="en-US" dirty="0" err="1"/>
-              <a:t>PropertyArray</a:t>
+              <a:rPr lang="en-US" dirty="0" smtClean="0"/>
+              <a:t>Medicine </a:t>
             </a:r>
             <a:r>
               <a:rPr lang="en-US" dirty="0"/>
-              <a:t>::=  Property  Properties</a:t>
-            </a:r>
-          </a:p>
-          <a:p>
-            <a:pPr marL="739775" lvl="1" indent="-457200">
+              <a:t>name = Aspirin</a:t>
+            </a:r>
+          </a:p>
+          <a:p>
+            <a:pPr marL="1257300" lvl="2" indent="-342900">
               <a:buFont typeface="+mj-lt"/>
               <a:buAutoNum type="arabicPeriod"/>
             </a:pPr>
             <a:r>
               <a:rPr lang="en-US" dirty="0"/>
-              <a:t>Properties ::= ‘,’ Property Properties | ‘]’</a:t>
-            </a:r>
-          </a:p>
-          <a:p>
-            <a:pPr marL="739775" lvl="1" indent="-457200">
+              <a:t>Doctor's name = Pedro Montero</a:t>
+            </a:r>
+          </a:p>
+          <a:p>
+            <a:pPr marL="1257300" lvl="2" indent="-342900">
               <a:buFont typeface="+mj-lt"/>
               <a:buAutoNum type="arabicPeriod"/>
             </a:pPr>
             <a:r>
               <a:rPr lang="en-US" dirty="0"/>
-              <a:t>Property ::= ‘{‘ </a:t>
-            </a:r>
-            <a:r>
-              <a:rPr lang="en-US" dirty="0" err="1"/>
-              <a:t>NameValuePair</a:t>
-            </a:r>
-            <a:endParaRPr lang="en-US" dirty="0"/>
-          </a:p>
-          <a:p>
-            <a:pPr marL="739775" lvl="1" indent="-457200">
+              <a:t>Pills quantity = 1</a:t>
+            </a:r>
+          </a:p>
+          <a:p>
+            <a:pPr marL="1257300" lvl="2" indent="-342900">
               <a:buFont typeface="+mj-lt"/>
               <a:buAutoNum type="arabicPeriod"/>
             </a:pPr>
             <a:r>
-              <a:rPr lang="en-US" dirty="0" err="1"/>
-              <a:t>NameValuePair</a:t>
-            </a:r>
-            <a:r>
               <a:rPr lang="en-US" dirty="0"/>
-              <a:t> ::= ‘ “name” :’ alphanumeric ‘,’ ‘ “value” :’ alphanumeric </a:t>
-            </a:r>
+              <a:t>Expiration Date (MM/DD/YY) = today + 1 month</a:t>
+            </a:r>
+          </a:p>
+          <a:p>
+            <a:pPr marL="1257300" lvl="2" indent="-342900">
+              <a:buFont typeface="+mj-lt"/>
+              <a:buAutoNum type="arabicPeriod"/>
+            </a:pPr>
+            <a:r>
+              <a:rPr lang="en-US" dirty="0"/>
+              <a:t>Mass = 1</a:t>
+            </a:r>
+          </a:p>
+          <a:p>
+            <a:pPr marL="1257300" lvl="2" indent="-342900">
+              <a:buFont typeface="+mj-lt"/>
+              <a:buAutoNum type="arabicPeriod"/>
+            </a:pPr>
+            <a:r>
+              <a:rPr lang="en-US" dirty="0"/>
+              <a:t>Dosage frequency (per day) = 4</a:t>
+            </a:r>
+          </a:p>
+          <a:p>
+            <a:pPr marL="1257300" lvl="2" indent="-342900">
+              <a:buFont typeface="+mj-lt"/>
+              <a:buAutoNum type="arabicPeriod"/>
+            </a:pPr>
+            <a:r>
+              <a:rPr lang="en-US" dirty="0"/>
+              <a:t>Frequency (days of the week) = daily</a:t>
+            </a:r>
+          </a:p>
+          <a:p>
+            <a:pPr marL="1257300" lvl="2" indent="-342900">
+              <a:buFont typeface="+mj-lt"/>
+              <a:buAutoNum type="arabicPeriod"/>
+            </a:pPr>
+            <a:r>
+              <a:rPr lang="en-US" dirty="0"/>
+              <a:t>Link with order container (type A, B, C) = none</a:t>
+            </a:r>
+          </a:p>
+          <a:p>
+            <a:pPr marL="1257300" lvl="2" indent="-342900">
+              <a:buFont typeface="+mj-lt"/>
+              <a:buAutoNum type="arabicPeriod"/>
+            </a:pPr>
+            <a:r>
+              <a:rPr lang="en-US" dirty="0"/>
+              <a:t>Symptoms = some Symptoms</a:t>
+            </a:r>
+          </a:p>
+          <a:p>
+            <a:pPr marL="1257300" lvl="2" indent="-342900">
+              <a:buFont typeface="+mj-lt"/>
+              <a:buAutoNum type="arabicPeriod"/>
+            </a:pPr>
+            <a:r>
+              <a:rPr lang="en-US" dirty="0"/>
+              <a:t>Side Effects = thinned blood</a:t>
+            </a:r>
+          </a:p>
+          <a:p>
             <a:r>
               <a:rPr lang="en-US" dirty="0" smtClean="0"/>
-              <a:t>‘}’</a:t>
+              <a:t>        </a:t>
+            </a:r>
+            <a:r>
+              <a:rPr lang="en-US" b="1" dirty="0" smtClean="0"/>
+              <a:t>Steps </a:t>
+            </a:r>
+            <a:r>
+              <a:rPr lang="en-US" b="1" dirty="0"/>
+              <a:t>to be executed:</a:t>
             </a:r>
             <a:endParaRPr lang="en-US" dirty="0"/>
+          </a:p>
+          <a:p>
+            <a:pPr marL="1257300" lvl="2" indent="-342900">
+              <a:buFont typeface="+mj-lt"/>
+              <a:buAutoNum type="arabicPeriod"/>
+            </a:pPr>
+            <a:r>
+              <a:rPr lang="en-US" dirty="0"/>
+              <a:t>Click button ‘Submit’</a:t>
+            </a:r>
+            <a:endParaRPr lang="en-US" dirty="0"/>
+          </a:p>
+          <a:p>
+            <a:r>
+              <a:rPr lang="en-US" dirty="0"/>
+              <a:t>        </a:t>
+            </a:r>
+            <a:endParaRPr lang="en-US" u="none" strike="noStrike" dirty="0">
+              <a:effectLst/>
+            </a:endParaRPr>
           </a:p>
         </p:txBody>
       </p:sp>
     </p:spTree>
     <p:extLst>
       <p:ext uri="{BB962C8B-B14F-4D97-AF65-F5344CB8AC3E}">
-        <p14:creationId xmlns:p14="http://schemas.microsoft.com/office/powerpoint/2010/main" val="2853038491"/>
+        <p14:creationId xmlns:p14="http://schemas.microsoft.com/office/powerpoint/2010/main" val="2164104484"/>
       </p:ext>
     </p:extLst>
   </p:cSld>
@@ -10904,34 +11140,223 @@
           </a:p>
         </p:txBody>
       </p:sp>
-      <p:pic>
-        <p:nvPicPr>
-          <p:cNvPr id="8" name="Picture 7"/>
-          <p:cNvPicPr>
-            <a:picLocks noChangeAspect="1"/>
-          </p:cNvPicPr>
+      <p:sp>
+        <p:nvSpPr>
+          <p:cNvPr id="7" name="Rectangle 6"/>
+          <p:cNvSpPr/>
           <p:nvPr/>
-        </p:nvPicPr>
-        <p:blipFill>
-          <a:blip r:embed="rId3"/>
-          <a:stretch>
-            <a:fillRect/>
-          </a:stretch>
-        </p:blipFill>
-        <p:spPr>
-          <a:xfrm>
-            <a:off x="1447800" y="1570835"/>
-            <a:ext cx="5962650" cy="4406102"/>
+        </p:nvSpPr>
+        <p:spPr>
+          <a:xfrm>
+            <a:off x="520353" y="1476238"/>
+            <a:ext cx="8101705" cy="4739759"/>
           </a:xfrm>
           <a:prstGeom prst="rect">
             <a:avLst/>
           </a:prstGeom>
         </p:spPr>
-      </p:pic>
+        <p:txBody>
+          <a:bodyPr wrap="none">
+            <a:spAutoFit/>
+          </a:bodyPr>
+          <a:lstStyle/>
+          <a:p>
+            <a:r>
+              <a:rPr lang="en-US" sz="2400" b="1" dirty="0"/>
+              <a:t>U</a:t>
+            </a:r>
+            <a:r>
+              <a:rPr lang="en-US" sz="2400" b="1" dirty="0" smtClean="0"/>
+              <a:t>. Story </a:t>
+            </a:r>
+            <a:r>
+              <a:rPr lang="en-US" sz="2400" b="1" dirty="0"/>
+              <a:t># 002 Add new medicine detailed information</a:t>
+            </a:r>
+            <a:r>
+              <a:rPr lang="en-US" sz="2400" dirty="0">
+                <a:solidFill>
+                  <a:srgbClr val="000000"/>
+                </a:solidFill>
+                <a:latin typeface="Arial" panose="020B0604020202020204" pitchFamily="34" charset="0"/>
+                <a:ea typeface="Times New Roman" panose="02020603050405020304" pitchFamily="18" charset="0"/>
+                <a:cs typeface="Arial" panose="020B0604020202020204" pitchFamily="34" charset="0"/>
+              </a:rPr>
+              <a:t> </a:t>
+            </a:r>
+          </a:p>
+          <a:p>
+            <a:pPr marL="342900" lvl="0" indent="-342900">
+              <a:buFont typeface="Arial" panose="020B0604020202020204" pitchFamily="34" charset="0"/>
+              <a:buChar char="●"/>
+            </a:pPr>
+            <a:endParaRPr lang="en-US" sz="800" b="1" dirty="0">
+              <a:latin typeface="Arial" panose="020B0604020202020204" pitchFamily="34" charset="0"/>
+              <a:ea typeface="Arial" panose="020B0604020202020204" pitchFamily="34" charset="0"/>
+              <a:cs typeface="Arial" panose="020B0604020202020204" pitchFamily="34" charset="0"/>
+            </a:endParaRPr>
+          </a:p>
+          <a:p>
+            <a:pPr lvl="0"/>
+            <a:r>
+              <a:rPr lang="en-US" b="1" dirty="0"/>
+              <a:t>Test 002C – Verify user can Submit data.</a:t>
+            </a:r>
+            <a:endParaRPr lang="en-US" dirty="0"/>
+          </a:p>
+          <a:p>
+            <a:r>
+              <a:rPr lang="en-US" b="1" dirty="0" smtClean="0"/>
+              <a:t>	Expected </a:t>
+            </a:r>
+            <a:r>
+              <a:rPr lang="en-US" b="1" dirty="0"/>
+              <a:t>result:</a:t>
+            </a:r>
+            <a:endParaRPr lang="en-US" dirty="0"/>
+          </a:p>
+          <a:p>
+            <a:pPr marL="1257300" lvl="2" indent="-342900">
+              <a:buFont typeface="+mj-lt"/>
+              <a:buAutoNum type="arabicPeriod"/>
+            </a:pPr>
+            <a:r>
+              <a:rPr lang="en-US" dirty="0"/>
+              <a:t>User is back at loading deck screen</a:t>
+            </a:r>
+          </a:p>
+          <a:p>
+            <a:pPr marL="1257300" lvl="2" indent="-342900">
+              <a:buFont typeface="+mj-lt"/>
+              <a:buAutoNum type="arabicPeriod"/>
+            </a:pPr>
+            <a:r>
+              <a:rPr lang="en-US" dirty="0"/>
+              <a:t>Data was saved to </a:t>
+            </a:r>
+            <a:r>
+              <a:rPr lang="en-US" dirty="0" smtClean="0"/>
+              <a:t>database:</a:t>
+            </a:r>
+            <a:endParaRPr lang="en-US" dirty="0"/>
+          </a:p>
+          <a:p>
+            <a:pPr marL="1714500" lvl="3" indent="-342900">
+              <a:buFont typeface="+mj-lt"/>
+              <a:buAutoNum type="alphaLcPeriod"/>
+            </a:pPr>
+            <a:r>
+              <a:rPr lang="en-US" dirty="0"/>
+              <a:t>Medicine name = Aspirin</a:t>
+            </a:r>
+          </a:p>
+          <a:p>
+            <a:pPr marL="1714500" lvl="3" indent="-342900">
+              <a:buFont typeface="+mj-lt"/>
+              <a:buAutoNum type="alphaLcPeriod"/>
+            </a:pPr>
+            <a:r>
+              <a:rPr lang="en-US" dirty="0"/>
+              <a:t>Doctor's name = Pedro Montero</a:t>
+            </a:r>
+          </a:p>
+          <a:p>
+            <a:pPr marL="1714500" lvl="3" indent="-342900">
+              <a:buFont typeface="+mj-lt"/>
+              <a:buAutoNum type="alphaLcPeriod"/>
+            </a:pPr>
+            <a:r>
+              <a:rPr lang="en-US" dirty="0"/>
+              <a:t>Pills quantity = 1</a:t>
+            </a:r>
+          </a:p>
+          <a:p>
+            <a:pPr marL="1714500" lvl="3" indent="-342900">
+              <a:buFont typeface="+mj-lt"/>
+              <a:buAutoNum type="alphaLcPeriod"/>
+            </a:pPr>
+            <a:r>
+              <a:rPr lang="en-US" dirty="0"/>
+              <a:t>Expiration Date (MM/DD/YY) = today + 1 month</a:t>
+            </a:r>
+          </a:p>
+          <a:p>
+            <a:pPr marL="1714500" lvl="3" indent="-342900">
+              <a:buFont typeface="+mj-lt"/>
+              <a:buAutoNum type="alphaLcPeriod"/>
+            </a:pPr>
+            <a:r>
+              <a:rPr lang="en-US" dirty="0"/>
+              <a:t>Mass = 1</a:t>
+            </a:r>
+          </a:p>
+          <a:p>
+            <a:pPr marL="1714500" lvl="3" indent="-342900">
+              <a:buFont typeface="+mj-lt"/>
+              <a:buAutoNum type="alphaLcPeriod"/>
+            </a:pPr>
+            <a:r>
+              <a:rPr lang="en-US" dirty="0"/>
+              <a:t>Dosage frequency (per day) = 4</a:t>
+            </a:r>
+          </a:p>
+          <a:p>
+            <a:pPr marL="1714500" lvl="3" indent="-342900">
+              <a:buFont typeface="+mj-lt"/>
+              <a:buAutoNum type="alphaLcPeriod"/>
+            </a:pPr>
+            <a:r>
+              <a:rPr lang="en-US" dirty="0"/>
+              <a:t>Frequency (days of the week) = daily</a:t>
+            </a:r>
+          </a:p>
+          <a:p>
+            <a:pPr marL="1714500" lvl="3" indent="-342900">
+              <a:buFont typeface="+mj-lt"/>
+              <a:buAutoNum type="alphaLcPeriod"/>
+            </a:pPr>
+            <a:r>
+              <a:rPr lang="en-US" dirty="0"/>
+              <a:t>Link with order container (type A, B, C) = none</a:t>
+            </a:r>
+          </a:p>
+          <a:p>
+            <a:pPr marL="1714500" lvl="3" indent="-342900">
+              <a:buFont typeface="+mj-lt"/>
+              <a:buAutoNum type="alphaLcPeriod"/>
+            </a:pPr>
+            <a:r>
+              <a:rPr lang="en-US" dirty="0"/>
+              <a:t>Symptoms = some Symptoms</a:t>
+            </a:r>
+          </a:p>
+          <a:p>
+            <a:pPr marL="1714500" lvl="3" indent="-342900">
+              <a:buFont typeface="+mj-lt"/>
+              <a:buAutoNum type="alphaLcPeriod"/>
+            </a:pPr>
+            <a:r>
+              <a:rPr lang="en-US" dirty="0"/>
+              <a:t>Side Effects = thinned blood</a:t>
+            </a:r>
+          </a:p>
+          <a:p>
+            <a:pPr marL="1257300" lvl="2" indent="-342900">
+              <a:buFont typeface="+mj-lt"/>
+              <a:buAutoNum type="arabicPeriod"/>
+            </a:pPr>
+            <a:r>
+              <a:rPr lang="en-US" dirty="0"/>
+              <a:t>JSON file sent to station</a:t>
+            </a:r>
+            <a:endParaRPr lang="en-US" dirty="0"/>
+          </a:p>
+        </p:txBody>
+      </p:sp>
     </p:spTree>
     <p:extLst>
       <p:ext uri="{BB962C8B-B14F-4D97-AF65-F5344CB8AC3E}">
-        <p14:creationId xmlns:p14="http://schemas.microsoft.com/office/powerpoint/2010/main" val="2164104484"/>
+        <p14:creationId xmlns:p14="http://schemas.microsoft.com/office/powerpoint/2010/main" val="2893735644"/>
       </p:ext>
     </p:extLst>
   </p:cSld>
@@ -10992,36 +11417,233 @@
           </a:p>
         </p:txBody>
       </p:sp>
-      <p:pic>
-        <p:nvPicPr>
-          <p:cNvPr id="6" name="Content Placeholder 5"/>
-          <p:cNvPicPr>
-            <a:picLocks noGrp="1" noChangeAspect="1"/>
-          </p:cNvPicPr>
-          <p:nvPr>
-            <p:ph idx="1"/>
-          </p:nvPr>
-        </p:nvPicPr>
-        <p:blipFill>
-          <a:blip r:embed="rId3"/>
-          <a:stretch>
-            <a:fillRect/>
-          </a:stretch>
-        </p:blipFill>
-        <p:spPr>
-          <a:xfrm>
-            <a:off x="1151731" y="2362200"/>
-            <a:ext cx="6838950" cy="2733675"/>
+      <p:sp>
+        <p:nvSpPr>
+          <p:cNvPr id="7" name="Rectangle 6"/>
+          <p:cNvSpPr/>
+          <p:nvPr/>
+        </p:nvSpPr>
+        <p:spPr>
+          <a:xfrm>
+            <a:off x="779464" y="1413290"/>
+            <a:ext cx="8628082" cy="4462760"/>
           </a:xfrm>
           <a:prstGeom prst="rect">
             <a:avLst/>
           </a:prstGeom>
         </p:spPr>
-      </p:pic>
+        <p:txBody>
+          <a:bodyPr wrap="square">
+            <a:spAutoFit/>
+          </a:bodyPr>
+          <a:lstStyle/>
+          <a:p>
+            <a:r>
+              <a:rPr lang="en-US" sz="2400" b="1" dirty="0"/>
+              <a:t>U</a:t>
+            </a:r>
+            <a:r>
+              <a:rPr lang="en-US" sz="2400" b="1" dirty="0" smtClean="0"/>
+              <a:t>. Story </a:t>
+            </a:r>
+            <a:r>
+              <a:rPr lang="en-US" sz="2400" b="1" dirty="0"/>
+              <a:t># 002 Add new medicine detailed information</a:t>
+            </a:r>
+            <a:r>
+              <a:rPr lang="en-US" sz="1050" dirty="0">
+                <a:solidFill>
+                  <a:srgbClr val="000000"/>
+                </a:solidFill>
+                <a:latin typeface="Arial" panose="020B0604020202020204" pitchFamily="34" charset="0"/>
+                <a:ea typeface="Times New Roman" panose="02020603050405020304" pitchFamily="18" charset="0"/>
+                <a:cs typeface="Arial" panose="020B0604020202020204" pitchFamily="34" charset="0"/>
+              </a:rPr>
+              <a:t> </a:t>
+            </a:r>
+            <a:endParaRPr lang="en-US" sz="1050" dirty="0" smtClean="0">
+              <a:solidFill>
+                <a:srgbClr val="000000"/>
+              </a:solidFill>
+              <a:latin typeface="Arial" panose="020B0604020202020204" pitchFamily="34" charset="0"/>
+              <a:ea typeface="Times New Roman" panose="02020603050405020304" pitchFamily="18" charset="0"/>
+              <a:cs typeface="Arial" panose="020B0604020202020204" pitchFamily="34" charset="0"/>
+            </a:endParaRPr>
+          </a:p>
+          <a:p>
+            <a:endParaRPr lang="en-US" sz="800" b="1" dirty="0" smtClean="0"/>
+          </a:p>
+          <a:p>
+            <a:pPr lvl="0"/>
+            <a:r>
+              <a:rPr lang="en-US" b="1" dirty="0" smtClean="0"/>
+              <a:t>Test </a:t>
+            </a:r>
+            <a:r>
+              <a:rPr lang="en-US" b="1" dirty="0"/>
+              <a:t>002D – Verify user can not submit without the Medicine Name.</a:t>
+            </a:r>
+            <a:endParaRPr lang="en-US" dirty="0"/>
+          </a:p>
+          <a:p>
+            <a:pPr lvl="1"/>
+            <a:r>
+              <a:rPr lang="en-US" b="1" dirty="0"/>
+              <a:t>Preconditions:</a:t>
+            </a:r>
+            <a:endParaRPr lang="en-US" dirty="0"/>
+          </a:p>
+          <a:p>
+            <a:pPr marL="1257300" lvl="2" indent="-342900">
+              <a:buFont typeface="+mj-lt"/>
+              <a:buAutoNum type="arabicPeriod"/>
+            </a:pPr>
+            <a:r>
+              <a:rPr lang="en-US" dirty="0"/>
+              <a:t>User must be on medicine detailed information form</a:t>
+            </a:r>
+            <a:endParaRPr lang="en-US" dirty="0"/>
+          </a:p>
+          <a:p>
+            <a:pPr lvl="1"/>
+            <a:r>
+              <a:rPr lang="en-US" b="1" dirty="0"/>
+              <a:t>Input Data:</a:t>
+            </a:r>
+            <a:endParaRPr lang="en-US" dirty="0"/>
+          </a:p>
+          <a:p>
+            <a:pPr marL="1257300" lvl="2" indent="-342900">
+              <a:buFont typeface="+mj-lt"/>
+              <a:buAutoNum type="arabicPeriod"/>
+            </a:pPr>
+            <a:r>
+              <a:rPr lang="en-US" dirty="0"/>
+              <a:t>Medicine name = </a:t>
+            </a:r>
+            <a:r>
+              <a:rPr lang="en-US" dirty="0">
+                <a:solidFill>
+                  <a:srgbClr val="FF0000"/>
+                </a:solidFill>
+              </a:rPr>
+              <a:t>null</a:t>
+            </a:r>
+            <a:endParaRPr lang="en-US" dirty="0">
+              <a:solidFill>
+                <a:srgbClr val="FF0000"/>
+              </a:solidFill>
+            </a:endParaRPr>
+          </a:p>
+          <a:p>
+            <a:pPr marL="1257300" lvl="2" indent="-342900">
+              <a:buFont typeface="+mj-lt"/>
+              <a:buAutoNum type="arabicPeriod"/>
+            </a:pPr>
+            <a:r>
+              <a:rPr lang="en-US" dirty="0"/>
+              <a:t>Doctor’s name = Pedro Montero</a:t>
+            </a:r>
+            <a:endParaRPr lang="en-US" dirty="0"/>
+          </a:p>
+          <a:p>
+            <a:pPr marL="1257300" lvl="2" indent="-342900">
+              <a:buFont typeface="+mj-lt"/>
+              <a:buAutoNum type="arabicPeriod"/>
+            </a:pPr>
+            <a:r>
+              <a:rPr lang="en-US" dirty="0"/>
+              <a:t>Pills quantity = 1</a:t>
+            </a:r>
+            <a:endParaRPr lang="en-US" dirty="0"/>
+          </a:p>
+          <a:p>
+            <a:pPr marL="1257300" lvl="2" indent="-342900">
+              <a:buFont typeface="+mj-lt"/>
+              <a:buAutoNum type="arabicPeriod"/>
+            </a:pPr>
+            <a:r>
+              <a:rPr lang="en-US" dirty="0"/>
+              <a:t>Expiration Date (MM/DD/YY) = today + 1 month</a:t>
+            </a:r>
+            <a:endParaRPr lang="en-US" dirty="0"/>
+          </a:p>
+          <a:p>
+            <a:pPr marL="1257300" lvl="2" indent="-342900">
+              <a:buFont typeface="+mj-lt"/>
+              <a:buAutoNum type="arabicPeriod"/>
+            </a:pPr>
+            <a:r>
+              <a:rPr lang="en-US" dirty="0"/>
+              <a:t>Mass = 1</a:t>
+            </a:r>
+            <a:endParaRPr lang="en-US" dirty="0"/>
+          </a:p>
+          <a:p>
+            <a:pPr marL="1257300" lvl="2" indent="-342900">
+              <a:buFont typeface="+mj-lt"/>
+              <a:buAutoNum type="arabicPeriod"/>
+            </a:pPr>
+            <a:r>
+              <a:rPr lang="en-US" dirty="0"/>
+              <a:t>Dosage frequency (per day) = 4</a:t>
+            </a:r>
+            <a:endParaRPr lang="en-US" dirty="0"/>
+          </a:p>
+          <a:p>
+            <a:pPr marL="1257300" lvl="2" indent="-342900">
+              <a:buFont typeface="+mj-lt"/>
+              <a:buAutoNum type="arabicPeriod"/>
+            </a:pPr>
+            <a:r>
+              <a:rPr lang="en-US" dirty="0"/>
+              <a:t>Frequency (days of the week) = daily</a:t>
+            </a:r>
+            <a:endParaRPr lang="en-US" dirty="0"/>
+          </a:p>
+          <a:p>
+            <a:pPr marL="1257300" lvl="2" indent="-342900">
+              <a:buFont typeface="+mj-lt"/>
+              <a:buAutoNum type="arabicPeriod"/>
+            </a:pPr>
+            <a:r>
+              <a:rPr lang="en-US" dirty="0"/>
+              <a:t>Link with order container (type A, B, C) = none</a:t>
+            </a:r>
+            <a:endParaRPr lang="en-US" dirty="0"/>
+          </a:p>
+          <a:p>
+            <a:pPr marL="1257300" lvl="2" indent="-342900">
+              <a:buFont typeface="+mj-lt"/>
+              <a:buAutoNum type="arabicPeriod"/>
+            </a:pPr>
+            <a:r>
+              <a:rPr lang="en-US" dirty="0"/>
+              <a:t>Symptoms = some Symptoms</a:t>
+            </a:r>
+            <a:endParaRPr lang="en-US" dirty="0"/>
+          </a:p>
+          <a:p>
+            <a:pPr marL="1257300" lvl="2" indent="-342900">
+              <a:buFont typeface="+mj-lt"/>
+              <a:buAutoNum type="arabicPeriod"/>
+            </a:pPr>
+            <a:r>
+              <a:rPr lang="en-US" dirty="0"/>
+              <a:t>Side Effects = thinned </a:t>
+            </a:r>
+            <a:r>
+              <a:rPr lang="en-US" dirty="0" smtClean="0"/>
+              <a:t>blood</a:t>
+            </a:r>
+            <a:endParaRPr lang="en-US" dirty="0"/>
+          </a:p>
+        </p:txBody>
+      </p:sp>
     </p:spTree>
     <p:extLst>
       <p:ext uri="{BB962C8B-B14F-4D97-AF65-F5344CB8AC3E}">
-        <p14:creationId xmlns:p14="http://schemas.microsoft.com/office/powerpoint/2010/main" val="2893735644"/>
+        <p14:creationId xmlns:p14="http://schemas.microsoft.com/office/powerpoint/2010/main" val="595053847"/>
       </p:ext>
     </p:extLst>
   </p:cSld>
@@ -11071,8 +11693,12 @@
           <a:lstStyle/>
           <a:p>
             <a:r>
+              <a:rPr lang="en-US" dirty="0"/>
+              <a:t>Test Suites and Test </a:t>
+            </a:r>
+            <a:r>
               <a:rPr lang="en-US" dirty="0" smtClean="0"/>
-              <a:t>Summary</a:t>
+              <a:t>Cases</a:t>
             </a:r>
             <a:endParaRPr lang="en-US" dirty="0"/>
           </a:p>
@@ -11080,63 +11706,178 @@
       </p:sp>
       <p:sp>
         <p:nvSpPr>
-          <p:cNvPr id="3" name="Content Placeholder 2"/>
-          <p:cNvSpPr>
-            <a:spLocks noGrp="1"/>
-          </p:cNvSpPr>
-          <p:nvPr>
-            <p:ph idx="1"/>
-          </p:nvPr>
-        </p:nvSpPr>
-        <p:spPr/>
-        <p:txBody>
-          <a:bodyPr/>
+          <p:cNvPr id="7" name="Rectangle 6"/>
+          <p:cNvSpPr/>
+          <p:nvPr/>
+        </p:nvSpPr>
+        <p:spPr>
+          <a:xfrm>
+            <a:off x="779464" y="1413290"/>
+            <a:ext cx="8628082" cy="3077766"/>
+          </a:xfrm>
+          <a:prstGeom prst="rect">
+            <a:avLst/>
+          </a:prstGeom>
+        </p:spPr>
+        <p:txBody>
+          <a:bodyPr wrap="square">
+            <a:spAutoFit/>
+          </a:bodyPr>
           <a:lstStyle/>
           <a:p>
             <a:r>
+              <a:rPr lang="en-US" sz="2400" b="1" dirty="0"/>
+              <a:t>U</a:t>
+            </a:r>
+            <a:r>
+              <a:rPr lang="en-US" sz="2400" b="1" dirty="0" smtClean="0"/>
+              <a:t>. Story </a:t>
+            </a:r>
+            <a:r>
+              <a:rPr lang="en-US" sz="2400" b="1" dirty="0"/>
+              <a:t># 002 Add new medicine detailed information</a:t>
+            </a:r>
+            <a:r>
+              <a:rPr lang="en-US" sz="1050" dirty="0">
+                <a:solidFill>
+                  <a:srgbClr val="000000"/>
+                </a:solidFill>
+                <a:latin typeface="Arial" panose="020B0604020202020204" pitchFamily="34" charset="0"/>
+                <a:ea typeface="Times New Roman" panose="02020603050405020304" pitchFamily="18" charset="0"/>
+                <a:cs typeface="Arial" panose="020B0604020202020204" pitchFamily="34" charset="0"/>
+              </a:rPr>
+              <a:t> </a:t>
+            </a:r>
+            <a:endParaRPr lang="en-US" sz="1050" dirty="0" smtClean="0">
+              <a:solidFill>
+                <a:srgbClr val="000000"/>
+              </a:solidFill>
+              <a:latin typeface="Arial" panose="020B0604020202020204" pitchFamily="34" charset="0"/>
+              <a:ea typeface="Times New Roman" panose="02020603050405020304" pitchFamily="18" charset="0"/>
+              <a:cs typeface="Arial" panose="020B0604020202020204" pitchFamily="34" charset="0"/>
+            </a:endParaRPr>
+          </a:p>
+          <a:p>
+            <a:endParaRPr lang="en-US" sz="800" b="1" dirty="0" smtClean="0"/>
+          </a:p>
+          <a:p>
+            <a:pPr lvl="0"/>
+            <a:r>
+              <a:rPr lang="en-US" b="1" dirty="0" smtClean="0"/>
+              <a:t>Test </a:t>
+            </a:r>
+            <a:r>
+              <a:rPr lang="en-US" b="1" dirty="0"/>
+              <a:t>002D – Verify user can not submit without the Medicine Name.</a:t>
+            </a:r>
+            <a:endParaRPr lang="en-US" dirty="0"/>
+          </a:p>
+          <a:p>
+            <a:pPr lvl="1"/>
+            <a:endParaRPr lang="en-US" b="1" dirty="0" smtClean="0"/>
+          </a:p>
+          <a:p>
+            <a:pPr lvl="1"/>
+            <a:r>
+              <a:rPr lang="en-US" b="1" dirty="0" smtClean="0"/>
+              <a:t>Steps </a:t>
+            </a:r>
+            <a:r>
+              <a:rPr lang="en-US" b="1" dirty="0"/>
+              <a:t>to be executed:</a:t>
+            </a:r>
+            <a:endParaRPr lang="en-US" dirty="0"/>
+          </a:p>
+          <a:p>
+            <a:pPr marL="1257300" lvl="2" indent="-342900">
+              <a:buFont typeface="+mj-lt"/>
+              <a:buAutoNum type="arabicPeriod"/>
+            </a:pPr>
+            <a:r>
               <a:rPr lang="en-US" dirty="0" smtClean="0"/>
-              <a:t>Medzmate 1.0 solution consists of two main software applications</a:t>
-            </a:r>
-          </a:p>
-          <a:p>
-            <a:pPr lvl="1">
-              <a:buFont typeface="Wingdings" panose="05000000000000000000" pitchFamily="2" charset="2"/>
-              <a:buChar char="§"/>
+              <a:t>Enter </a:t>
+            </a:r>
+            <a:r>
+              <a:rPr lang="en-US" dirty="0"/>
+              <a:t>data</a:t>
+            </a:r>
+            <a:endParaRPr lang="en-US" dirty="0"/>
+          </a:p>
+          <a:p>
+            <a:pPr marL="1257300" lvl="2" indent="-342900">
+              <a:buFont typeface="+mj-lt"/>
+              <a:buAutoNum type="arabicPeriod"/>
             </a:pPr>
             <a:r>
               <a:rPr lang="en-US" dirty="0" smtClean="0"/>
-              <a:t>Medzmate Mobile Application &amp; Medzmate Station</a:t>
-            </a:r>
-          </a:p>
-          <a:p>
+              <a:t>Click </a:t>
+            </a:r>
+            <a:r>
+              <a:rPr lang="en-US" dirty="0"/>
+              <a:t>button ‘Submit’</a:t>
+            </a:r>
+            <a:endParaRPr lang="en-US" dirty="0"/>
+          </a:p>
+          <a:p>
+            <a:pPr lvl="1"/>
+            <a:endParaRPr lang="en-US" b="1" dirty="0" smtClean="0"/>
+          </a:p>
+          <a:p>
+            <a:pPr lvl="1"/>
+            <a:r>
+              <a:rPr lang="en-US" b="1" dirty="0" smtClean="0"/>
+              <a:t>Expected </a:t>
+            </a:r>
+            <a:r>
+              <a:rPr lang="en-US" b="1" dirty="0"/>
+              <a:t>result:</a:t>
+            </a:r>
+            <a:endParaRPr lang="en-US" dirty="0"/>
+          </a:p>
+          <a:p>
+            <a:pPr lvl="1"/>
+            <a:r>
+              <a:rPr lang="en-US" dirty="0"/>
+              <a:t>Form scrolls to </a:t>
+            </a:r>
             <a:r>
               <a:rPr lang="en-US" dirty="0" smtClean="0"/>
-              <a:t>Medzmate Mobile Application will be the configuration tool used by health care providers to set up each Medzmate Station with the prescribed schedule.</a:t>
-            </a:r>
-          </a:p>
-          <a:p>
+              <a:t>the Medicine </a:t>
+            </a:r>
+            <a:r>
+              <a:rPr lang="en-US" dirty="0"/>
+              <a:t>name field and </a:t>
+            </a:r>
             <a:r>
               <a:rPr lang="en-US" dirty="0" smtClean="0"/>
-              <a:t>Medzmate Station will dispense the right medications at the right time according to the </a:t>
+              <a:t>displays </a:t>
             </a:r>
             <a:r>
               <a:rPr lang="en-US" dirty="0"/>
-              <a:t>prescribed </a:t>
-            </a:r>
+              <a:t>a </a:t>
+            </a:r>
+            <a:endParaRPr lang="en-US" dirty="0" smtClean="0"/>
+          </a:p>
+          <a:p>
+            <a:pPr lvl="1"/>
             <a:r>
               <a:rPr lang="en-US" dirty="0" smtClean="0"/>
-              <a:t>schedule.</a:t>
-            </a:r>
-          </a:p>
-          <a:p>
-            <a:endParaRPr lang="en-US" dirty="0"/>
+              <a:t>“</a:t>
+            </a:r>
+            <a:r>
+              <a:rPr lang="en-US" dirty="0"/>
+              <a:t>Required field message”</a:t>
+            </a:r>
+            <a:endParaRPr lang="en-US" u="none" strike="noStrike" dirty="0">
+              <a:effectLst/>
+            </a:endParaRPr>
           </a:p>
         </p:txBody>
       </p:sp>
     </p:spTree>
     <p:extLst>
       <p:ext uri="{BB962C8B-B14F-4D97-AF65-F5344CB8AC3E}">
-        <p14:creationId xmlns:p14="http://schemas.microsoft.com/office/powerpoint/2010/main" val="977874096"/>
+        <p14:creationId xmlns:p14="http://schemas.microsoft.com/office/powerpoint/2010/main" val="2308028071"/>
       </p:ext>
     </p:extLst>
   </p:cSld>
@@ -11252,7 +11993,11 @@
             </a:pPr>
             <a:r>
               <a:rPr lang="is-IS" sz="1600" dirty="0" smtClean="0"/>
-              <a:t>It dispenses only the right medications at the right time.</a:t>
+              <a:t>It dispenses only the right medications at the right time</a:t>
+            </a:r>
+            <a:r>
+              <a:rPr lang="is-IS" sz="1600" dirty="0" smtClean="0"/>
+              <a:t>.</a:t>
             </a:r>
           </a:p>
           <a:p>
@@ -11261,7 +12006,7 @@
             </a:pPr>
             <a:r>
               <a:rPr lang="is-IS" sz="1600" dirty="0" smtClean="0"/>
-              <a:t>Supports real time alerts and notifications.</a:t>
+              <a:t>The process of setting and refilling the machine can only be done by a health care provider</a:t>
             </a:r>
           </a:p>
           <a:p>
@@ -11269,9 +12014,14 @@
               <a:defRPr/>
             </a:pPr>
             <a:r>
+              <a:rPr lang="is-IS" sz="1600" dirty="0"/>
+              <a:t>The software solution consists of a mobile application and a scheduler process running in the Medzmate Station</a:t>
+            </a:r>
+            <a:r>
               <a:rPr lang="is-IS" sz="1600" dirty="0" smtClean="0"/>
-              <a:t>The software solution consists of a mobile application and a scheduler process running in the Medzmate Station.</a:t>
-            </a:r>
+              <a:t>.</a:t>
+            </a:r>
+            <a:endParaRPr lang="is-IS" sz="1600" dirty="0" smtClean="0"/>
           </a:p>
           <a:p>
             <a:pPr>
@@ -11288,8 +12038,17 @@
             </a:pPr>
             <a:r>
               <a:rPr lang="en-US" sz="1600" dirty="0" smtClean="0"/>
-              <a:t>Design and develop the process running within the Medzmate Station.</a:t>
-            </a:r>
+              <a:t>Design and develop the </a:t>
+            </a:r>
+            <a:r>
+              <a:rPr lang="en-US" sz="1600" dirty="0" err="1" smtClean="0"/>
+              <a:t>Medzmate</a:t>
+            </a:r>
+            <a:r>
+              <a:rPr lang="en-US" sz="1600" dirty="0" smtClean="0"/>
+              <a:t> mobile application.</a:t>
+            </a:r>
+            <a:endParaRPr lang="en-US" sz="1600" dirty="0" smtClean="0"/>
           </a:p>
         </p:txBody>
       </p:sp>
@@ -11342,7 +12101,7 @@
           <a:p>
             <a:r>
               <a:rPr lang="en-US" dirty="0" smtClean="0"/>
-              <a:t>Q&amp;A</a:t>
+              <a:t>Summary</a:t>
             </a:r>
             <a:endParaRPr lang="en-US" dirty="0"/>
           </a:p>
@@ -11365,20 +12124,191 @@
           <a:p>
             <a:r>
               <a:rPr lang="en-US" dirty="0" smtClean="0"/>
-              <a:t>Contact </a:t>
-            </a:r>
-            <a:r>
-              <a:rPr lang="en-US" smtClean="0"/>
-              <a:t>Information</a:t>
-            </a:r>
-            <a:r>
-              <a:rPr lang="en-US" smtClean="0"/>
+              <a:t>Medzmate 1.0 solution consists of two main software applications</a:t>
+            </a:r>
+          </a:p>
+          <a:p>
+            <a:pPr lvl="1">
+              <a:buFont typeface="Wingdings" panose="05000000000000000000" pitchFamily="2" charset="2"/>
+              <a:buChar char="§"/>
+            </a:pPr>
+            <a:r>
+              <a:rPr lang="en-US" dirty="0" smtClean="0"/>
+              <a:t>Medzmate Mobile Application &amp; Medzmate Station</a:t>
+            </a:r>
+          </a:p>
+          <a:p>
+            <a:r>
+              <a:rPr lang="en-US" dirty="0" smtClean="0"/>
+              <a:t>Medzmate Mobile Application will be the configuration tool used by health care providers to set up each Medzmate Station with the prescribed schedule.</a:t>
+            </a:r>
+          </a:p>
+          <a:p>
+            <a:r>
+              <a:rPr lang="en-US" dirty="0" smtClean="0"/>
+              <a:t>Medzmate Station will dispense the right medications at the right time according to the </a:t>
+            </a:r>
+            <a:r>
+              <a:rPr lang="en-US" dirty="0"/>
+              <a:t>prescribed </a:t>
+            </a:r>
+            <a:r>
+              <a:rPr lang="en-US" dirty="0" smtClean="0"/>
+              <a:t>schedule.</a:t>
+            </a:r>
+          </a:p>
+          <a:p>
+            <a:endParaRPr lang="en-US" dirty="0"/>
+          </a:p>
+        </p:txBody>
+      </p:sp>
+    </p:spTree>
+    <p:extLst>
+      <p:ext uri="{BB962C8B-B14F-4D97-AF65-F5344CB8AC3E}">
+        <p14:creationId xmlns:p14="http://schemas.microsoft.com/office/powerpoint/2010/main" val="977874096"/>
+      </p:ext>
+    </p:extLst>
+  </p:cSld>
+  <p:clrMapOvr>
+    <a:masterClrMapping/>
+  </p:clrMapOvr>
+  <p:timing>
+    <p:tnLst>
+      <p:par>
+        <p:cTn id="1" dur="indefinite" restart="never" nodeType="tmRoot"/>
+      </p:par>
+    </p:tnLst>
+  </p:timing>
+</p:sld>
+</file>
+
+<file path=ppt/slides/slide21.xml><?xml version="1.0" encoding="utf-8"?>
+<p:sld xmlns:a="http://schemas.openxmlformats.org/drawingml/2006/main" xmlns:r="http://schemas.openxmlformats.org/officeDocument/2006/relationships" xmlns:p="http://schemas.openxmlformats.org/presentationml/2006/main">
+  <p:cSld>
+    <p:spTree>
+      <p:nvGrpSpPr>
+        <p:cNvPr id="1" name=""/>
+        <p:cNvGrpSpPr/>
+        <p:nvPr/>
+      </p:nvGrpSpPr>
+      <p:grpSpPr>
+        <a:xfrm>
+          <a:off x="0" y="0"/>
+          <a:ext cx="0" cy="0"/>
+          <a:chOff x="0" y="0"/>
+          <a:chExt cx="0" cy="0"/>
+        </a:xfrm>
+      </p:grpSpPr>
+      <p:sp>
+        <p:nvSpPr>
+          <p:cNvPr id="2" name="Title 1"/>
+          <p:cNvSpPr>
+            <a:spLocks noGrp="1"/>
+          </p:cNvSpPr>
+          <p:nvPr>
+            <p:ph type="title"/>
+          </p:nvPr>
+        </p:nvSpPr>
+        <p:spPr/>
+        <p:txBody>
+          <a:bodyPr/>
+          <a:lstStyle/>
+          <a:p>
+            <a:r>
+              <a:rPr lang="en-US" dirty="0" smtClean="0"/>
+              <a:t>Q&amp;A</a:t>
+            </a:r>
+            <a:endParaRPr lang="en-US" dirty="0"/>
+          </a:p>
+        </p:txBody>
+      </p:sp>
+      <p:sp>
+        <p:nvSpPr>
+          <p:cNvPr id="3" name="Content Placeholder 2"/>
+          <p:cNvSpPr>
+            <a:spLocks noGrp="1"/>
+          </p:cNvSpPr>
+          <p:nvPr>
+            <p:ph idx="1"/>
+          </p:nvPr>
+        </p:nvSpPr>
+        <p:spPr>
+          <a:xfrm>
+            <a:off x="4544703" y="2438400"/>
+            <a:ext cx="4142098" cy="1752600"/>
+          </a:xfrm>
+        </p:spPr>
+        <p:txBody>
+          <a:bodyPr/>
+          <a:lstStyle/>
+          <a:p>
+            <a:r>
+              <a:rPr lang="en-US" dirty="0" smtClean="0"/>
+              <a:t>Contact Information</a:t>
+            </a:r>
+            <a:r>
+              <a:rPr lang="en-US" dirty="0" smtClean="0"/>
               <a:t>:</a:t>
             </a:r>
+          </a:p>
+          <a:p>
+            <a:pPr lvl="2"/>
+            <a:r>
+              <a:rPr lang="en-US" dirty="0" smtClean="0"/>
+              <a:t>Pedro Montero</a:t>
+            </a:r>
+          </a:p>
+          <a:p>
+            <a:pPr lvl="2"/>
+            <a:r>
+              <a:rPr lang="en-US" dirty="0" smtClean="0"/>
+              <a:t>Email: pmont016@fiu.edu</a:t>
+            </a:r>
             <a:endParaRPr lang="en-US" dirty="0" smtClean="0"/>
           </a:p>
         </p:txBody>
       </p:sp>
+      <p:pic>
+        <p:nvPicPr>
+          <p:cNvPr id="1026" name="Picture 2" descr="http://vignette4.wikia.nocookie.net/isleoftune/images/4/43/Image-Q%26A.png/revision/latest?cb=20120330015257"/>
+          <p:cNvPicPr>
+            <a:picLocks noChangeAspect="1" noChangeArrowheads="1"/>
+          </p:cNvPicPr>
+          <p:nvPr/>
+        </p:nvPicPr>
+        <p:blipFill>
+          <a:blip r:embed="rId3">
+            <a:extLst>
+              <a:ext uri="{28A0092B-C50C-407E-A947-70E740481C1C}">
+                <a14:useLocalDpi xmlns:a14="http://schemas.microsoft.com/office/drawing/2010/main" val="0"/>
+              </a:ext>
+            </a:extLst>
+          </a:blip>
+          <a:srcRect/>
+          <a:stretch>
+            <a:fillRect/>
+          </a:stretch>
+        </p:blipFill>
+        <p:spPr bwMode="auto">
+          <a:xfrm>
+            <a:off x="152400" y="2209800"/>
+            <a:ext cx="4648200" cy="4648200"/>
+          </a:xfrm>
+          <a:prstGeom prst="rect">
+            <a:avLst/>
+          </a:prstGeom>
+          <a:noFill/>
+          <a:extLst>
+            <a:ext uri="{909E8E84-426E-40DD-AFC4-6F175D3DCCD1}">
+              <a14:hiddenFill xmlns:a14="http://schemas.microsoft.com/office/drawing/2010/main">
+                <a:solidFill>
+                  <a:srgbClr val="FFFFFF"/>
+                </a:solidFill>
+              </a14:hiddenFill>
+            </a:ext>
+          </a:extLst>
+        </p:spPr>
+      </p:pic>
     </p:spTree>
     <p:extLst>
       <p:ext uri="{BB962C8B-B14F-4D97-AF65-F5344CB8AC3E}">
@@ -11399,7 +12329,7 @@
 </p:sld>
 </file>
 
-<file path=ppt/slides/slide21.xml><?xml version="1.0" encoding="utf-8"?>
+<file path=ppt/slides/slide22.xml><?xml version="1.0" encoding="utf-8"?>
 <p:sld xmlns:a="http://schemas.openxmlformats.org/drawingml/2006/main" xmlns:r="http://schemas.openxmlformats.org/officeDocument/2006/relationships" xmlns:p="http://schemas.openxmlformats.org/presentationml/2006/main">
   <p:cSld>
     <p:spTree>
@@ -19112,7 +20042,6 @@
               <a:rPr lang="en-US" dirty="0" smtClean="0"/>
               <a:t>Add new medicine information</a:t>
             </a:r>
-            <a:endParaRPr lang="en-US" dirty="0" smtClean="0"/>
           </a:p>
           <a:p>
             <a:r>
@@ -19128,11 +20057,7 @@
           <a:p>
             <a:r>
               <a:rPr lang="en-US" dirty="0"/>
-              <a:t>App-Station Pharmacist </a:t>
-            </a:r>
-            <a:r>
-              <a:rPr lang="en-US" dirty="0"/>
-              <a:t>Login</a:t>
+              <a:t>App-Station Pharmacist Login</a:t>
             </a:r>
           </a:p>
           <a:p>
@@ -19146,7 +20071,6 @@
               <a:rPr lang="en-US" dirty="0"/>
               <a:t>User should confirm the entered medicine detailed information</a:t>
             </a:r>
-            <a:endParaRPr lang="en-US" dirty="0"/>
           </a:p>
         </p:txBody>
       </p:sp>
@@ -19227,21 +20151,13 @@
           <a:p>
             <a:r>
               <a:rPr lang="en-US" dirty="0"/>
-              <a:t>Main </a:t>
-            </a:r>
+              <a:t>Main Screen</a:t>
+            </a:r>
+          </a:p>
+          <a:p>
             <a:r>
               <a:rPr lang="en-US" dirty="0"/>
-              <a:t>Screen</a:t>
-            </a:r>
-          </a:p>
-          <a:p>
-            <a:r>
-              <a:rPr lang="en-US" dirty="0"/>
-              <a:t>Patient </a:t>
-            </a:r>
-            <a:r>
-              <a:rPr lang="en-US" dirty="0"/>
-              <a:t>Information</a:t>
+              <a:t>Patient Information</a:t>
             </a:r>
           </a:p>
           <a:p>
@@ -19431,7 +20347,7 @@
         </p:blipFill>
         <p:spPr>
           <a:xfrm>
-            <a:off x="1219200" y="1752600"/>
+            <a:off x="1186070" y="1981200"/>
             <a:ext cx="6405245" cy="3972560"/>
           </a:xfrm>
           <a:prstGeom prst="rect">
@@ -19440,6 +20356,35 @@
           <a:ln/>
         </p:spPr>
       </p:pic>
+      <p:sp>
+        <p:nvSpPr>
+          <p:cNvPr id="3" name="TextBox 2"/>
+          <p:cNvSpPr txBox="1"/>
+          <p:nvPr/>
+        </p:nvSpPr>
+        <p:spPr>
+          <a:xfrm>
+            <a:off x="1097281" y="1485873"/>
+            <a:ext cx="6751319" cy="369332"/>
+          </a:xfrm>
+          <a:prstGeom prst="rect">
+            <a:avLst/>
+          </a:prstGeom>
+          <a:noFill/>
+        </p:spPr>
+        <p:txBody>
+          <a:bodyPr wrap="square" rtlCol="0">
+            <a:spAutoFit/>
+          </a:bodyPr>
+          <a:lstStyle/>
+          <a:p>
+            <a:r>
+              <a:rPr lang="en-US" dirty="0"/>
+              <a:t>UC-001 Login sequence diagram (u = username, p = password)</a:t>
+            </a:r>
+          </a:p>
+        </p:txBody>
+      </p:sp>
     </p:spTree>
     <p:extLst>
       <p:ext uri="{BB962C8B-B14F-4D97-AF65-F5344CB8AC3E}">
@@ -19507,7 +20452,7 @@
       </p:sp>
       <p:pic>
         <p:nvPicPr>
-          <p:cNvPr id="5" name="image24.png"/>
+          <p:cNvPr id="4" name="image49.png"/>
           <p:cNvPicPr/>
           <p:nvPr/>
         </p:nvPicPr>
@@ -19520,8 +20465,8 @@
         </p:blipFill>
         <p:spPr>
           <a:xfrm>
-            <a:off x="1524000" y="1828800"/>
-            <a:ext cx="5943600" cy="3695700"/>
+            <a:off x="1410017" y="1905000"/>
+            <a:ext cx="6323965" cy="4052570"/>
           </a:xfrm>
           <a:prstGeom prst="rect">
             <a:avLst/>
@@ -19529,10 +20474,38 @@
           <a:ln/>
         </p:spPr>
       </p:pic>
+      <p:sp>
+        <p:nvSpPr>
+          <p:cNvPr id="3" name="Rectangle 2"/>
+          <p:cNvSpPr/>
+          <p:nvPr/>
+        </p:nvSpPr>
+        <p:spPr>
+          <a:xfrm>
+            <a:off x="782776" y="1440340"/>
+            <a:ext cx="8361224" cy="369332"/>
+          </a:xfrm>
+          <a:prstGeom prst="rect">
+            <a:avLst/>
+          </a:prstGeom>
+        </p:spPr>
+        <p:txBody>
+          <a:bodyPr wrap="square">
+            <a:spAutoFit/>
+          </a:bodyPr>
+          <a:lstStyle/>
+          <a:p>
+            <a:r>
+              <a:rPr lang="en-US" dirty="0"/>
+              <a:t>UC - 003 Save medicine information sequence diagram</a:t>
+            </a:r>
+          </a:p>
+        </p:txBody>
+      </p:sp>
     </p:spTree>
     <p:extLst>
       <p:ext uri="{BB962C8B-B14F-4D97-AF65-F5344CB8AC3E}">
-        <p14:creationId xmlns:p14="http://schemas.microsoft.com/office/powerpoint/2010/main" val="1062316422"/>
+        <p14:creationId xmlns:p14="http://schemas.microsoft.com/office/powerpoint/2010/main" val="1978967700"/>
       </p:ext>
     </p:extLst>
   </p:cSld>
@@ -19576,19 +20549,14 @@
             <p:ph type="title"/>
           </p:nvPr>
         </p:nvSpPr>
-        <p:spPr>
-          <a:xfrm>
-            <a:off x="779463" y="381000"/>
-            <a:ext cx="8059737" cy="1044575"/>
-          </a:xfrm>
-        </p:spPr>
+        <p:spPr/>
         <p:txBody>
           <a:bodyPr/>
           <a:lstStyle/>
           <a:p>
             <a:r>
               <a:rPr lang="en-US" dirty="0" smtClean="0"/>
-              <a:t>Requirements: Sequence Diagrams</a:t>
+              <a:t>System Design: Architecture</a:t>
             </a:r>
             <a:endParaRPr lang="en-US" dirty="0"/>
           </a:p>
@@ -19596,9 +20564,13 @@
       </p:sp>
       <p:pic>
         <p:nvPicPr>
-          <p:cNvPr id="4" name="image49.png"/>
-          <p:cNvPicPr/>
-          <p:nvPr/>
+          <p:cNvPr id="4" name="image44.png"/>
+          <p:cNvPicPr>
+            <a:picLocks noGrp="1"/>
+          </p:cNvPicPr>
+          <p:nvPr>
+            <p:ph idx="1"/>
+          </p:nvPr>
         </p:nvPicPr>
         <p:blipFill>
           <a:blip r:embed="rId3"/>
@@ -19609,8 +20581,8 @@
         </p:blipFill>
         <p:spPr>
           <a:xfrm>
-            <a:off x="1410017" y="1676400"/>
-            <a:ext cx="6323965" cy="4052570"/>
+            <a:off x="381000" y="1704975"/>
+            <a:ext cx="3086100" cy="3876675"/>
           </a:xfrm>
           <a:prstGeom prst="rect">
             <a:avLst/>
@@ -19618,10 +20590,112 @@
           <a:ln/>
         </p:spPr>
       </p:pic>
+      <p:sp>
+        <p:nvSpPr>
+          <p:cNvPr id="6" name="TextBox 5"/>
+          <p:cNvSpPr txBox="1"/>
+          <p:nvPr/>
+        </p:nvSpPr>
+        <p:spPr>
+          <a:xfrm>
+            <a:off x="533400" y="5581650"/>
+            <a:ext cx="2590800" cy="307777"/>
+          </a:xfrm>
+          <a:prstGeom prst="rect">
+            <a:avLst/>
+          </a:prstGeom>
+          <a:noFill/>
+        </p:spPr>
+        <p:txBody>
+          <a:bodyPr wrap="square" rtlCol="0">
+            <a:spAutoFit/>
+          </a:bodyPr>
+          <a:lstStyle/>
+          <a:p>
+            <a:r>
+              <a:rPr lang="en-US" sz="1400" dirty="0"/>
+              <a:t>Medzmate 3-tier </a:t>
+            </a:r>
+            <a:r>
+              <a:rPr lang="en-US" sz="1400" dirty="0" smtClean="0"/>
+              <a:t>Architecture</a:t>
+            </a:r>
+            <a:endParaRPr lang="en-US" sz="1400" dirty="0"/>
+          </a:p>
+        </p:txBody>
+      </p:sp>
+      <p:sp>
+        <p:nvSpPr>
+          <p:cNvPr id="7" name="TextBox 6"/>
+          <p:cNvSpPr txBox="1"/>
+          <p:nvPr/>
+        </p:nvSpPr>
+        <p:spPr>
+          <a:xfrm>
+            <a:off x="4152900" y="5581649"/>
+            <a:ext cx="4210050" cy="307777"/>
+          </a:xfrm>
+          <a:prstGeom prst="rect">
+            <a:avLst/>
+          </a:prstGeom>
+          <a:noFill/>
+        </p:spPr>
+        <p:txBody>
+          <a:bodyPr wrap="square" rtlCol="0">
+            <a:spAutoFit/>
+          </a:bodyPr>
+          <a:lstStyle/>
+          <a:p>
+            <a:r>
+              <a:rPr lang="en-US" sz="1400" dirty="0" err="1" smtClean="0"/>
+              <a:t>Medzmate</a:t>
+            </a:r>
+            <a:r>
+              <a:rPr lang="en-US" sz="1400" dirty="0" smtClean="0"/>
+              <a:t> </a:t>
+            </a:r>
+            <a:r>
+              <a:rPr lang="en-US" sz="1400" dirty="0" err="1"/>
+              <a:t>Medzmate</a:t>
+            </a:r>
+            <a:r>
+              <a:rPr lang="en-US" sz="1400" dirty="0"/>
+              <a:t> Event-Driven Architecture</a:t>
+            </a:r>
+            <a:r>
+              <a:rPr lang="en-US" sz="1400" dirty="0" smtClean="0"/>
+              <a:t>.</a:t>
+            </a:r>
+            <a:endParaRPr lang="en-US" sz="1400" dirty="0"/>
+          </a:p>
+        </p:txBody>
+      </p:sp>
+      <p:pic>
+        <p:nvPicPr>
+          <p:cNvPr id="8" name="image45.png"/>
+          <p:cNvPicPr/>
+          <p:nvPr/>
+        </p:nvPicPr>
+        <p:blipFill rotWithShape="1">
+          <a:blip r:embed="rId4"/>
+          <a:srcRect l="7334" r="12666"/>
+          <a:stretch/>
+        </p:blipFill>
+        <p:spPr>
+          <a:xfrm>
+            <a:off x="3790950" y="1681162"/>
+            <a:ext cx="4572000" cy="3924300"/>
+          </a:xfrm>
+          <a:prstGeom prst="rect">
+            <a:avLst/>
+          </a:prstGeom>
+          <a:ln/>
+        </p:spPr>
+      </p:pic>
     </p:spTree>
     <p:extLst>
       <p:ext uri="{BB962C8B-B14F-4D97-AF65-F5344CB8AC3E}">
-        <p14:creationId xmlns:p14="http://schemas.microsoft.com/office/powerpoint/2010/main" val="1978967700"/>
+        <p14:creationId xmlns:p14="http://schemas.microsoft.com/office/powerpoint/2010/main" val="4211570898"/>
       </p:ext>
     </p:extLst>
   </p:cSld>

</xml_diff>